<commit_message>
20211122 remove unnessesary data
</commit_message>
<xml_diff>
--- a/project1/pages/小專.pptx
+++ b/project1/pages/小專.pptx
@@ -10,10 +10,11 @@
     <p:sldId id="259" r:id="rId4"/>
     <p:sldId id="258" r:id="rId5"/>
     <p:sldId id="260" r:id="rId6"/>
-    <p:sldId id="261" r:id="rId7"/>
-    <p:sldId id="262" r:id="rId8"/>
+    <p:sldId id="262" r:id="rId7"/>
+    <p:sldId id="261" r:id="rId8"/>
     <p:sldId id="263" r:id="rId9"/>
-    <p:sldId id="264" r:id="rId10"/>
+    <p:sldId id="265" r:id="rId10"/>
+    <p:sldId id="264" r:id="rId11"/>
   </p:sldIdLst>
   <p:sldSz cx="12192000" cy="6858000"/>
   <p:notesSz cx="6858000" cy="9144000"/>
@@ -122,9 +123,10 @@
             <p14:sldId id="259"/>
             <p14:sldId id="258"/>
             <p14:sldId id="260"/>
+            <p14:sldId id="262"/>
             <p14:sldId id="261"/>
-            <p14:sldId id="262"/>
             <p14:sldId id="263"/>
+            <p14:sldId id="265"/>
             <p14:sldId id="264"/>
           </p14:sldIdLst>
         </p14:section>
@@ -268,7 +270,7 @@
           <a:p>
             <a:fld id="{CA5A0B1D-AD6D-44F2-A3F8-96B45C3EAEF0}" type="datetimeFigureOut">
               <a:rPr lang="zh-TW" altLang="en-US" smtClean="0"/>
-              <a:t>2023/11/15</a:t>
+              <a:t>2023/11/16</a:t>
             </a:fld>
             <a:endParaRPr lang="zh-TW" altLang="en-US"/>
           </a:p>
@@ -438,7 +440,7 @@
           <a:p>
             <a:fld id="{CA5A0B1D-AD6D-44F2-A3F8-96B45C3EAEF0}" type="datetimeFigureOut">
               <a:rPr lang="zh-TW" altLang="en-US" smtClean="0"/>
-              <a:t>2023/11/15</a:t>
+              <a:t>2023/11/16</a:t>
             </a:fld>
             <a:endParaRPr lang="zh-TW" altLang="en-US"/>
           </a:p>
@@ -618,7 +620,7 @@
           <a:p>
             <a:fld id="{CA5A0B1D-AD6D-44F2-A3F8-96B45C3EAEF0}" type="datetimeFigureOut">
               <a:rPr lang="zh-TW" altLang="en-US" smtClean="0"/>
-              <a:t>2023/11/15</a:t>
+              <a:t>2023/11/16</a:t>
             </a:fld>
             <a:endParaRPr lang="zh-TW" altLang="en-US"/>
           </a:p>
@@ -788,7 +790,7 @@
           <a:p>
             <a:fld id="{CA5A0B1D-AD6D-44F2-A3F8-96B45C3EAEF0}" type="datetimeFigureOut">
               <a:rPr lang="zh-TW" altLang="en-US" smtClean="0"/>
-              <a:t>2023/11/15</a:t>
+              <a:t>2023/11/16</a:t>
             </a:fld>
             <a:endParaRPr lang="zh-TW" altLang="en-US"/>
           </a:p>
@@ -1034,7 +1036,7 @@
           <a:p>
             <a:fld id="{CA5A0B1D-AD6D-44F2-A3F8-96B45C3EAEF0}" type="datetimeFigureOut">
               <a:rPr lang="zh-TW" altLang="en-US" smtClean="0"/>
-              <a:t>2023/11/15</a:t>
+              <a:t>2023/11/16</a:t>
             </a:fld>
             <a:endParaRPr lang="zh-TW" altLang="en-US"/>
           </a:p>
@@ -1266,7 +1268,7 @@
           <a:p>
             <a:fld id="{CA5A0B1D-AD6D-44F2-A3F8-96B45C3EAEF0}" type="datetimeFigureOut">
               <a:rPr lang="zh-TW" altLang="en-US" smtClean="0"/>
-              <a:t>2023/11/15</a:t>
+              <a:t>2023/11/16</a:t>
             </a:fld>
             <a:endParaRPr lang="zh-TW" altLang="en-US"/>
           </a:p>
@@ -1633,7 +1635,7 @@
           <a:p>
             <a:fld id="{CA5A0B1D-AD6D-44F2-A3F8-96B45C3EAEF0}" type="datetimeFigureOut">
               <a:rPr lang="zh-TW" altLang="en-US" smtClean="0"/>
-              <a:t>2023/11/15</a:t>
+              <a:t>2023/11/16</a:t>
             </a:fld>
             <a:endParaRPr lang="zh-TW" altLang="en-US"/>
           </a:p>
@@ -1751,7 +1753,7 @@
           <a:p>
             <a:fld id="{CA5A0B1D-AD6D-44F2-A3F8-96B45C3EAEF0}" type="datetimeFigureOut">
               <a:rPr lang="zh-TW" altLang="en-US" smtClean="0"/>
-              <a:t>2023/11/15</a:t>
+              <a:t>2023/11/16</a:t>
             </a:fld>
             <a:endParaRPr lang="zh-TW" altLang="en-US"/>
           </a:p>
@@ -1846,7 +1848,7 @@
           <a:p>
             <a:fld id="{CA5A0B1D-AD6D-44F2-A3F8-96B45C3EAEF0}" type="datetimeFigureOut">
               <a:rPr lang="zh-TW" altLang="en-US" smtClean="0"/>
-              <a:t>2023/11/15</a:t>
+              <a:t>2023/11/16</a:t>
             </a:fld>
             <a:endParaRPr lang="zh-TW" altLang="en-US"/>
           </a:p>
@@ -2123,7 +2125,7 @@
           <a:p>
             <a:fld id="{CA5A0B1D-AD6D-44F2-A3F8-96B45C3EAEF0}" type="datetimeFigureOut">
               <a:rPr lang="zh-TW" altLang="en-US" smtClean="0"/>
-              <a:t>2023/11/15</a:t>
+              <a:t>2023/11/16</a:t>
             </a:fld>
             <a:endParaRPr lang="zh-TW" altLang="en-US"/>
           </a:p>
@@ -2380,7 +2382,7 @@
           <a:p>
             <a:fld id="{CA5A0B1D-AD6D-44F2-A3F8-96B45C3EAEF0}" type="datetimeFigureOut">
               <a:rPr lang="zh-TW" altLang="en-US" smtClean="0"/>
-              <a:t>2023/11/15</a:t>
+              <a:t>2023/11/16</a:t>
             </a:fld>
             <a:endParaRPr lang="zh-TW" altLang="en-US"/>
           </a:p>
@@ -2599,7 +2601,7 @@
           <a:p>
             <a:fld id="{CA5A0B1D-AD6D-44F2-A3F8-96B45C3EAEF0}" type="datetimeFigureOut">
               <a:rPr lang="zh-TW" altLang="en-US" smtClean="0"/>
-              <a:t>2023/11/15</a:t>
+              <a:t>2023/11/16</a:t>
             </a:fld>
             <a:endParaRPr lang="zh-TW" altLang="en-US"/>
           </a:p>
@@ -3122,6 +3124,72 @@
 </p:sld>
 </file>
 
+<file path=ppt/slides/slide10.xml><?xml version="1.0" encoding="utf-8"?>
+<p:sld xmlns:a="http://schemas.openxmlformats.org/drawingml/2006/main" xmlns:r="http://schemas.openxmlformats.org/officeDocument/2006/relationships" xmlns:p="http://schemas.openxmlformats.org/presentationml/2006/main">
+  <p:cSld>
+    <p:spTree>
+      <p:nvGrpSpPr>
+        <p:cNvPr id="1" name=""/>
+        <p:cNvGrpSpPr/>
+        <p:nvPr/>
+      </p:nvGrpSpPr>
+      <p:grpSpPr>
+        <a:xfrm>
+          <a:off x="0" y="0"/>
+          <a:ext cx="0" cy="0"/>
+          <a:chOff x="0" y="0"/>
+          <a:chExt cx="0" cy="0"/>
+        </a:xfrm>
+      </p:grpSpPr>
+      <p:sp>
+        <p:nvSpPr>
+          <p:cNvPr id="2" name="文字方塊 1">
+            <a:extLst>
+              <a:ext uri="{FF2B5EF4-FFF2-40B4-BE49-F238E27FC236}">
+                <a16:creationId xmlns:a16="http://schemas.microsoft.com/office/drawing/2014/main" id="{A5E24B5C-A8E3-3B87-50D7-E6B8CA499D96}"/>
+              </a:ext>
+            </a:extLst>
+          </p:cNvPr>
+          <p:cNvSpPr txBox="1"/>
+          <p:nvPr/>
+        </p:nvSpPr>
+        <p:spPr>
+          <a:xfrm>
+            <a:off x="4981575" y="2667000"/>
+            <a:ext cx="6838950" cy="1015663"/>
+          </a:xfrm>
+          <a:prstGeom prst="rect">
+            <a:avLst/>
+          </a:prstGeom>
+          <a:noFill/>
+        </p:spPr>
+        <p:txBody>
+          <a:bodyPr wrap="square" rtlCol="0">
+            <a:spAutoFit/>
+          </a:bodyPr>
+          <a:lstStyle/>
+          <a:p>
+            <a:r>
+              <a:rPr lang="en-US" altLang="zh-TW" sz="6000" b="1" dirty="0"/>
+              <a:t>End</a:t>
+            </a:r>
+            <a:endParaRPr lang="zh-TW" altLang="en-US" sz="6000" b="1" dirty="0"/>
+          </a:p>
+        </p:txBody>
+      </p:sp>
+    </p:spTree>
+    <p:extLst>
+      <p:ext uri="{BB962C8B-B14F-4D97-AF65-F5344CB8AC3E}">
+        <p14:creationId xmlns:p14="http://schemas.microsoft.com/office/powerpoint/2010/main" val="1384770515"/>
+      </p:ext>
+    </p:extLst>
+  </p:cSld>
+  <p:clrMapOvr>
+    <a:masterClrMapping/>
+  </p:clrMapOvr>
+</p:sld>
+</file>
+
 <file path=ppt/slides/slide2.xml><?xml version="1.0" encoding="utf-8"?>
 <p:sld xmlns:a="http://schemas.openxmlformats.org/drawingml/2006/main" xmlns:r="http://schemas.openxmlformats.org/officeDocument/2006/relationships" xmlns:p="http://schemas.openxmlformats.org/presentationml/2006/main">
   <p:cSld>
@@ -3226,6 +3294,25 @@
                 <a:ea typeface="標楷體" panose="03000509000000000000" pitchFamily="65" charset="-120"/>
               </a:rPr>
               <a:t>架構說明</a:t>
+            </a:r>
+            <a:endParaRPr lang="en-US" altLang="zh-TW" dirty="0">
+              <a:latin typeface="標楷體" panose="03000509000000000000" pitchFamily="65" charset="-120"/>
+              <a:ea typeface="標楷體" panose="03000509000000000000" pitchFamily="65" charset="-120"/>
+            </a:endParaRPr>
+          </a:p>
+          <a:p>
+            <a:endParaRPr lang="en-US" altLang="zh-TW" dirty="0">
+              <a:latin typeface="標楷體" panose="03000509000000000000" pitchFamily="65" charset="-120"/>
+              <a:ea typeface="標楷體" panose="03000509000000000000" pitchFamily="65" charset="-120"/>
+            </a:endParaRPr>
+          </a:p>
+          <a:p>
+            <a:r>
+              <a:rPr lang="zh-TW" altLang="en-US" dirty="0">
+                <a:latin typeface="標楷體" panose="03000509000000000000" pitchFamily="65" charset="-120"/>
+                <a:ea typeface="標楷體" panose="03000509000000000000" pitchFamily="65" charset="-120"/>
+              </a:rPr>
+              <a:t>製作歷程</a:t>
             </a:r>
             <a:endParaRPr lang="en-US" altLang="zh-TW" dirty="0">
               <a:latin typeface="標楷體" panose="03000509000000000000" pitchFamily="65" charset="-120"/>
@@ -3304,7 +3391,7 @@
         <p:spPr>
           <a:xfrm>
             <a:off x="392076" y="258283"/>
-            <a:ext cx="4550734" cy="584775"/>
+            <a:ext cx="4550734" cy="1077218"/>
           </a:xfrm>
           <a:prstGeom prst="rect">
             <a:avLst/>
@@ -3322,8 +3409,18 @@
                 <a:latin typeface="標楷體" panose="03000509000000000000" pitchFamily="65" charset="-120"/>
                 <a:ea typeface="標楷體" panose="03000509000000000000" pitchFamily="65" charset="-120"/>
               </a:rPr>
-              <a:t>起源</a:t>
-            </a:r>
+              <a:t>介紹</a:t>
+            </a:r>
+            <a:endParaRPr lang="en-US" altLang="zh-TW" sz="3200" b="1" dirty="0">
+              <a:latin typeface="標楷體" panose="03000509000000000000" pitchFamily="65" charset="-120"/>
+              <a:ea typeface="標楷體" panose="03000509000000000000" pitchFamily="65" charset="-120"/>
+            </a:endParaRPr>
+          </a:p>
+          <a:p>
+            <a:endParaRPr lang="zh-TW" altLang="en-US" sz="3200" b="1" dirty="0">
+              <a:latin typeface="標楷體" panose="03000509000000000000" pitchFamily="65" charset="-120"/>
+              <a:ea typeface="標楷體" panose="03000509000000000000" pitchFamily="65" charset="-120"/>
+            </a:endParaRPr>
           </a:p>
         </p:txBody>
       </p:sp>
@@ -3736,7 +3833,7 @@
                 <a:latin typeface="標楷體" panose="03000509000000000000" pitchFamily="65" charset="-120"/>
                 <a:ea typeface="標楷體" panose="03000509000000000000" pitchFamily="65" charset="-120"/>
               </a:rPr>
-              <a:t>姓名筆劃組合得到一個大吉的評分</a:t>
+              <a:t>姓名筆劃組合得到一個厲害的評分</a:t>
             </a:r>
             <a:endParaRPr lang="en-US" altLang="zh-TW" sz="2400" dirty="0">
               <a:latin typeface="標楷體" panose="03000509000000000000" pitchFamily="65" charset="-120"/>
@@ -3766,7 +3863,7 @@
                 <a:latin typeface="標楷體" panose="03000509000000000000" pitchFamily="65" charset="-120"/>
                 <a:ea typeface="標楷體" panose="03000509000000000000" pitchFamily="65" charset="-120"/>
               </a:rPr>
-              <a:t>在這個筆畫選一個對的屬性字來微調八字屬性</a:t>
+              <a:t>在這個筆畫組合選字來微調屬性</a:t>
             </a:r>
             <a:endParaRPr lang="en-US" altLang="zh-TW" sz="2400" dirty="0">
               <a:latin typeface="標楷體" panose="03000509000000000000" pitchFamily="65" charset="-120"/>
@@ -4100,7 +4197,7 @@
                 <a:latin typeface="標楷體" panose="03000509000000000000" pitchFamily="65" charset="-120"/>
                 <a:ea typeface="標楷體" panose="03000509000000000000" pitchFamily="65" charset="-120"/>
               </a:rPr>
-              <a:t>名字計算規則介紹</a:t>
+              <a:t>介紹</a:t>
             </a:r>
             <a:endParaRPr lang="en-US" altLang="zh-TW" sz="3200" b="1" dirty="0">
               <a:latin typeface="標楷體" panose="03000509000000000000" pitchFamily="65" charset="-120"/>
@@ -5442,6 +5539,1499 @@
 </file>
 
 <file path=ppt/slides/slide6.xml><?xml version="1.0" encoding="utf-8"?>
+<p:sld xmlns:a="http://schemas.openxmlformats.org/drawingml/2006/main" xmlns:r="http://schemas.openxmlformats.org/officeDocument/2006/relationships" xmlns:p="http://schemas.openxmlformats.org/presentationml/2006/main">
+  <p:cSld>
+    <p:spTree>
+      <p:nvGrpSpPr>
+        <p:cNvPr id="1" name=""/>
+        <p:cNvGrpSpPr/>
+        <p:nvPr/>
+      </p:nvGrpSpPr>
+      <p:grpSpPr>
+        <a:xfrm>
+          <a:off x="0" y="0"/>
+          <a:ext cx="0" cy="0"/>
+          <a:chOff x="0" y="0"/>
+          <a:chExt cx="0" cy="0"/>
+        </a:xfrm>
+      </p:grpSpPr>
+      <p:sp>
+        <p:nvSpPr>
+          <p:cNvPr id="2" name="矩形: 圓角 1">
+            <a:extLst>
+              <a:ext uri="{FF2B5EF4-FFF2-40B4-BE49-F238E27FC236}">
+                <a16:creationId xmlns:a16="http://schemas.microsoft.com/office/drawing/2014/main" id="{ECC3DB5C-A9E8-FF41-0C23-A63318979377}"/>
+              </a:ext>
+            </a:extLst>
+          </p:cNvPr>
+          <p:cNvSpPr/>
+          <p:nvPr/>
+        </p:nvSpPr>
+        <p:spPr>
+          <a:xfrm>
+            <a:off x="832440" y="843072"/>
+            <a:ext cx="1743740" cy="701750"/>
+          </a:xfrm>
+          <a:prstGeom prst="roundRect">
+            <a:avLst/>
+          </a:prstGeom>
+          <a:ln w="38100"/>
+        </p:spPr>
+        <p:style>
+          <a:lnRef idx="2">
+            <a:schemeClr val="accent6"/>
+          </a:lnRef>
+          <a:fillRef idx="1">
+            <a:schemeClr val="lt1"/>
+          </a:fillRef>
+          <a:effectRef idx="0">
+            <a:schemeClr val="accent6"/>
+          </a:effectRef>
+          <a:fontRef idx="minor">
+            <a:schemeClr val="dk1"/>
+          </a:fontRef>
+        </p:style>
+        <p:txBody>
+          <a:bodyPr rtlCol="0" anchor="ctr"/>
+          <a:lstStyle/>
+          <a:p>
+            <a:pPr algn="ctr"/>
+            <a:r>
+              <a:rPr lang="zh-TW" altLang="en-US" sz="2800" b="1" dirty="0">
+                <a:latin typeface="標楷體" panose="03000509000000000000" pitchFamily="65" charset="-120"/>
+                <a:ea typeface="標楷體" panose="03000509000000000000" pitchFamily="65" charset="-120"/>
+              </a:rPr>
+              <a:t>頁面</a:t>
+            </a:r>
+          </a:p>
+        </p:txBody>
+      </p:sp>
+      <p:sp>
+        <p:nvSpPr>
+          <p:cNvPr id="3" name="矩形: 圓角 2">
+            <a:extLst>
+              <a:ext uri="{FF2B5EF4-FFF2-40B4-BE49-F238E27FC236}">
+                <a16:creationId xmlns:a16="http://schemas.microsoft.com/office/drawing/2014/main" id="{C1E49841-E41C-6D2E-B34F-5B1256EE002F}"/>
+              </a:ext>
+            </a:extLst>
+          </p:cNvPr>
+          <p:cNvSpPr/>
+          <p:nvPr/>
+        </p:nvSpPr>
+        <p:spPr>
+          <a:xfrm>
+            <a:off x="5512758" y="798364"/>
+            <a:ext cx="1743740" cy="701750"/>
+          </a:xfrm>
+          <a:prstGeom prst="roundRect">
+            <a:avLst/>
+          </a:prstGeom>
+          <a:ln w="38100"/>
+        </p:spPr>
+        <p:style>
+          <a:lnRef idx="2">
+            <a:schemeClr val="accent6"/>
+          </a:lnRef>
+          <a:fillRef idx="1">
+            <a:schemeClr val="lt1"/>
+          </a:fillRef>
+          <a:effectRef idx="0">
+            <a:schemeClr val="accent6"/>
+          </a:effectRef>
+          <a:fontRef idx="minor">
+            <a:schemeClr val="dk1"/>
+          </a:fontRef>
+        </p:style>
+        <p:txBody>
+          <a:bodyPr rtlCol="0" anchor="ctr"/>
+          <a:lstStyle/>
+          <a:p>
+            <a:pPr algn="ctr"/>
+            <a:r>
+              <a:rPr lang="zh-TW" altLang="en-US" sz="2800" b="1" dirty="0">
+                <a:latin typeface="標楷體" panose="03000509000000000000" pitchFamily="65" charset="-120"/>
+                <a:ea typeface="標楷體" panose="03000509000000000000" pitchFamily="65" charset="-120"/>
+              </a:rPr>
+              <a:t>伺服器</a:t>
+            </a:r>
+          </a:p>
+        </p:txBody>
+      </p:sp>
+      <p:sp>
+        <p:nvSpPr>
+          <p:cNvPr id="4" name="矩形: 圓角 3">
+            <a:extLst>
+              <a:ext uri="{FF2B5EF4-FFF2-40B4-BE49-F238E27FC236}">
+                <a16:creationId xmlns:a16="http://schemas.microsoft.com/office/drawing/2014/main" id="{B8EEB4A2-7A52-A3B0-2947-560C20CE3C31}"/>
+              </a:ext>
+            </a:extLst>
+          </p:cNvPr>
+          <p:cNvSpPr/>
+          <p:nvPr/>
+        </p:nvSpPr>
+        <p:spPr>
+          <a:xfrm>
+            <a:off x="9324309" y="843072"/>
+            <a:ext cx="1743740" cy="701750"/>
+          </a:xfrm>
+          <a:prstGeom prst="roundRect">
+            <a:avLst/>
+          </a:prstGeom>
+          <a:ln w="38100"/>
+        </p:spPr>
+        <p:style>
+          <a:lnRef idx="2">
+            <a:schemeClr val="accent6"/>
+          </a:lnRef>
+          <a:fillRef idx="1">
+            <a:schemeClr val="lt1"/>
+          </a:fillRef>
+          <a:effectRef idx="0">
+            <a:schemeClr val="accent6"/>
+          </a:effectRef>
+          <a:fontRef idx="minor">
+            <a:schemeClr val="dk1"/>
+          </a:fontRef>
+        </p:style>
+        <p:txBody>
+          <a:bodyPr rtlCol="0" anchor="ctr"/>
+          <a:lstStyle/>
+          <a:p>
+            <a:pPr algn="ctr"/>
+            <a:r>
+              <a:rPr lang="zh-TW" altLang="en-US" sz="2800" b="1" dirty="0">
+                <a:latin typeface="標楷體" panose="03000509000000000000" pitchFamily="65" charset="-120"/>
+                <a:ea typeface="標楷體" panose="03000509000000000000" pitchFamily="65" charset="-120"/>
+              </a:rPr>
+              <a:t>資料庫</a:t>
+            </a:r>
+          </a:p>
+        </p:txBody>
+      </p:sp>
+      <p:sp>
+        <p:nvSpPr>
+          <p:cNvPr id="6" name="矩形: 圓角 5">
+            <a:extLst>
+              <a:ext uri="{FF2B5EF4-FFF2-40B4-BE49-F238E27FC236}">
+                <a16:creationId xmlns:a16="http://schemas.microsoft.com/office/drawing/2014/main" id="{B1ADD0E5-2D4C-3257-DFF2-8AAF7B3680E0}"/>
+              </a:ext>
+            </a:extLst>
+          </p:cNvPr>
+          <p:cNvSpPr/>
+          <p:nvPr/>
+        </p:nvSpPr>
+        <p:spPr>
+          <a:xfrm>
+            <a:off x="570170" y="1846076"/>
+            <a:ext cx="2268280" cy="578846"/>
+          </a:xfrm>
+          <a:prstGeom prst="roundRect">
+            <a:avLst/>
+          </a:prstGeom>
+          <a:ln w="38100"/>
+        </p:spPr>
+        <p:style>
+          <a:lnRef idx="2">
+            <a:schemeClr val="accent1"/>
+          </a:lnRef>
+          <a:fillRef idx="1">
+            <a:schemeClr val="lt1"/>
+          </a:fillRef>
+          <a:effectRef idx="0">
+            <a:schemeClr val="accent1"/>
+          </a:effectRef>
+          <a:fontRef idx="minor">
+            <a:schemeClr val="dk1"/>
+          </a:fontRef>
+        </p:style>
+        <p:txBody>
+          <a:bodyPr rtlCol="0" anchor="ctr"/>
+          <a:lstStyle/>
+          <a:p>
+            <a:pPr algn="ctr"/>
+            <a:r>
+              <a:rPr lang="zh-TW" altLang="en-US" sz="2800" b="1" dirty="0">
+                <a:latin typeface="標楷體" panose="03000509000000000000" pitchFamily="65" charset="-120"/>
+                <a:ea typeface="標楷體" panose="03000509000000000000" pitchFamily="65" charset="-120"/>
+              </a:rPr>
+              <a:t>輸入姓名</a:t>
+            </a:r>
+          </a:p>
+        </p:txBody>
+      </p:sp>
+      <p:sp>
+        <p:nvSpPr>
+          <p:cNvPr id="7" name="箭號: 向右 6">
+            <a:extLst>
+              <a:ext uri="{FF2B5EF4-FFF2-40B4-BE49-F238E27FC236}">
+                <a16:creationId xmlns:a16="http://schemas.microsoft.com/office/drawing/2014/main" id="{DE604356-48D0-362A-3BF3-73B8C6A6478E}"/>
+              </a:ext>
+            </a:extLst>
+          </p:cNvPr>
+          <p:cNvSpPr/>
+          <p:nvPr/>
+        </p:nvSpPr>
+        <p:spPr>
+          <a:xfrm>
+            <a:off x="3019426" y="1915629"/>
+            <a:ext cx="1466849" cy="337843"/>
+          </a:xfrm>
+          <a:prstGeom prst="rightArrow">
+            <a:avLst/>
+          </a:prstGeom>
+        </p:spPr>
+        <p:style>
+          <a:lnRef idx="2">
+            <a:schemeClr val="accent1">
+              <a:shade val="15000"/>
+            </a:schemeClr>
+          </a:lnRef>
+          <a:fillRef idx="1">
+            <a:schemeClr val="accent1"/>
+          </a:fillRef>
+          <a:effectRef idx="0">
+            <a:schemeClr val="accent1"/>
+          </a:effectRef>
+          <a:fontRef idx="minor">
+            <a:schemeClr val="lt1"/>
+          </a:fontRef>
+        </p:style>
+        <p:txBody>
+          <a:bodyPr rtlCol="0" anchor="ctr"/>
+          <a:lstStyle/>
+          <a:p>
+            <a:pPr algn="ctr"/>
+            <a:endParaRPr lang="zh-TW" altLang="en-US"/>
+          </a:p>
+        </p:txBody>
+      </p:sp>
+      <p:sp>
+        <p:nvSpPr>
+          <p:cNvPr id="8" name="矩形: 圓角 7">
+            <a:extLst>
+              <a:ext uri="{FF2B5EF4-FFF2-40B4-BE49-F238E27FC236}">
+                <a16:creationId xmlns:a16="http://schemas.microsoft.com/office/drawing/2014/main" id="{58F7607A-455D-3416-9F4E-C1F0A37259D3}"/>
+              </a:ext>
+            </a:extLst>
+          </p:cNvPr>
+          <p:cNvSpPr/>
+          <p:nvPr/>
+        </p:nvSpPr>
+        <p:spPr>
+          <a:xfrm>
+            <a:off x="4606114" y="1846077"/>
+            <a:ext cx="3240272" cy="578846"/>
+          </a:xfrm>
+          <a:prstGeom prst="roundRect">
+            <a:avLst/>
+          </a:prstGeom>
+          <a:ln w="38100"/>
+        </p:spPr>
+        <p:style>
+          <a:lnRef idx="2">
+            <a:schemeClr val="accent1"/>
+          </a:lnRef>
+          <a:fillRef idx="1">
+            <a:schemeClr val="lt1"/>
+          </a:fillRef>
+          <a:effectRef idx="0">
+            <a:schemeClr val="accent1"/>
+          </a:effectRef>
+          <a:fontRef idx="minor">
+            <a:schemeClr val="dk1"/>
+          </a:fontRef>
+        </p:style>
+        <p:txBody>
+          <a:bodyPr rtlCol="0" anchor="ctr"/>
+          <a:lstStyle/>
+          <a:p>
+            <a:pPr algn="ctr"/>
+            <a:r>
+              <a:rPr lang="zh-TW" altLang="en-US" sz="2800" b="1" dirty="0">
+                <a:latin typeface="標楷體" panose="03000509000000000000" pitchFamily="65" charset="-120"/>
+                <a:ea typeface="標楷體" panose="03000509000000000000" pitchFamily="65" charset="-120"/>
+              </a:rPr>
+              <a:t>向資料庫查詢筆畫</a:t>
+            </a:r>
+          </a:p>
+        </p:txBody>
+      </p:sp>
+      <p:sp>
+        <p:nvSpPr>
+          <p:cNvPr id="9" name="箭號: 向右 8">
+            <a:extLst>
+              <a:ext uri="{FF2B5EF4-FFF2-40B4-BE49-F238E27FC236}">
+                <a16:creationId xmlns:a16="http://schemas.microsoft.com/office/drawing/2014/main" id="{606F9C8B-1B04-F4CA-94B1-127D7516EEA8}"/>
+              </a:ext>
+            </a:extLst>
+          </p:cNvPr>
+          <p:cNvSpPr/>
+          <p:nvPr/>
+        </p:nvSpPr>
+        <p:spPr>
+          <a:xfrm>
+            <a:off x="8125492" y="1721306"/>
+            <a:ext cx="757346" cy="297918"/>
+          </a:xfrm>
+          <a:prstGeom prst="rightArrow">
+            <a:avLst/>
+          </a:prstGeom>
+        </p:spPr>
+        <p:style>
+          <a:lnRef idx="2">
+            <a:schemeClr val="accent1">
+              <a:shade val="15000"/>
+            </a:schemeClr>
+          </a:lnRef>
+          <a:fillRef idx="1">
+            <a:schemeClr val="accent1"/>
+          </a:fillRef>
+          <a:effectRef idx="0">
+            <a:schemeClr val="accent1"/>
+          </a:effectRef>
+          <a:fontRef idx="minor">
+            <a:schemeClr val="lt1"/>
+          </a:fontRef>
+        </p:style>
+        <p:txBody>
+          <a:bodyPr rtlCol="0" anchor="ctr"/>
+          <a:lstStyle/>
+          <a:p>
+            <a:pPr algn="ctr"/>
+            <a:endParaRPr lang="zh-TW" altLang="en-US"/>
+          </a:p>
+        </p:txBody>
+      </p:sp>
+      <p:sp>
+        <p:nvSpPr>
+          <p:cNvPr id="11" name="矩形: 圓角 10">
+            <a:extLst>
+              <a:ext uri="{FF2B5EF4-FFF2-40B4-BE49-F238E27FC236}">
+                <a16:creationId xmlns:a16="http://schemas.microsoft.com/office/drawing/2014/main" id="{F5BAE114-57EB-4D64-F84F-5741E2F0088D}"/>
+              </a:ext>
+            </a:extLst>
+          </p:cNvPr>
+          <p:cNvSpPr/>
+          <p:nvPr/>
+        </p:nvSpPr>
+        <p:spPr>
+          <a:xfrm>
+            <a:off x="9172574" y="1674249"/>
+            <a:ext cx="2414479" cy="750673"/>
+          </a:xfrm>
+          <a:prstGeom prst="roundRect">
+            <a:avLst/>
+          </a:prstGeom>
+          <a:ln w="38100"/>
+        </p:spPr>
+        <p:style>
+          <a:lnRef idx="2">
+            <a:schemeClr val="accent1"/>
+          </a:lnRef>
+          <a:fillRef idx="1">
+            <a:schemeClr val="lt1"/>
+          </a:fillRef>
+          <a:effectRef idx="0">
+            <a:schemeClr val="accent1"/>
+          </a:effectRef>
+          <a:fontRef idx="minor">
+            <a:schemeClr val="dk1"/>
+          </a:fontRef>
+        </p:style>
+        <p:txBody>
+          <a:bodyPr rtlCol="0" anchor="ctr"/>
+          <a:lstStyle/>
+          <a:p>
+            <a:pPr algn="ctr"/>
+            <a:r>
+              <a:rPr lang="zh-TW" altLang="en-US" sz="2800" b="1" dirty="0">
+                <a:latin typeface="標楷體" panose="03000509000000000000" pitchFamily="65" charset="-120"/>
+                <a:ea typeface="標楷體" panose="03000509000000000000" pitchFamily="65" charset="-120"/>
+              </a:rPr>
+              <a:t>搜尋筆畫</a:t>
+            </a:r>
+          </a:p>
+        </p:txBody>
+      </p:sp>
+      <p:sp>
+        <p:nvSpPr>
+          <p:cNvPr id="12" name="箭號: 向右 11">
+            <a:extLst>
+              <a:ext uri="{FF2B5EF4-FFF2-40B4-BE49-F238E27FC236}">
+                <a16:creationId xmlns:a16="http://schemas.microsoft.com/office/drawing/2014/main" id="{8AA6A847-37E4-EE1C-9234-08A8A81084D5}"/>
+              </a:ext>
+            </a:extLst>
+          </p:cNvPr>
+          <p:cNvSpPr/>
+          <p:nvPr/>
+        </p:nvSpPr>
+        <p:spPr>
+          <a:xfrm rot="10800000">
+            <a:off x="8103892" y="2190182"/>
+            <a:ext cx="757346" cy="297918"/>
+          </a:xfrm>
+          <a:prstGeom prst="rightArrow">
+            <a:avLst/>
+          </a:prstGeom>
+        </p:spPr>
+        <p:style>
+          <a:lnRef idx="2">
+            <a:schemeClr val="accent1">
+              <a:shade val="15000"/>
+            </a:schemeClr>
+          </a:lnRef>
+          <a:fillRef idx="1">
+            <a:schemeClr val="accent1"/>
+          </a:fillRef>
+          <a:effectRef idx="0">
+            <a:schemeClr val="accent1"/>
+          </a:effectRef>
+          <a:fontRef idx="minor">
+            <a:schemeClr val="lt1"/>
+          </a:fontRef>
+        </p:style>
+        <p:txBody>
+          <a:bodyPr rtlCol="0" anchor="ctr"/>
+          <a:lstStyle/>
+          <a:p>
+            <a:pPr algn="ctr"/>
+            <a:endParaRPr lang="zh-TW" altLang="en-US" dirty="0"/>
+          </a:p>
+        </p:txBody>
+      </p:sp>
+      <p:sp>
+        <p:nvSpPr>
+          <p:cNvPr id="13" name="箭號: 向右 12">
+            <a:extLst>
+              <a:ext uri="{FF2B5EF4-FFF2-40B4-BE49-F238E27FC236}">
+                <a16:creationId xmlns:a16="http://schemas.microsoft.com/office/drawing/2014/main" id="{C7A0647B-46D2-9D53-3580-1F6FD5239A62}"/>
+              </a:ext>
+            </a:extLst>
+          </p:cNvPr>
+          <p:cNvSpPr/>
+          <p:nvPr/>
+        </p:nvSpPr>
+        <p:spPr>
+          <a:xfrm rot="5400000">
+            <a:off x="6108414" y="2427531"/>
+            <a:ext cx="335571" cy="477800"/>
+          </a:xfrm>
+          <a:prstGeom prst="rightArrow">
+            <a:avLst/>
+          </a:prstGeom>
+        </p:spPr>
+        <p:style>
+          <a:lnRef idx="2">
+            <a:schemeClr val="accent1">
+              <a:shade val="15000"/>
+            </a:schemeClr>
+          </a:lnRef>
+          <a:fillRef idx="1">
+            <a:schemeClr val="accent1"/>
+          </a:fillRef>
+          <a:effectRef idx="0">
+            <a:schemeClr val="accent1"/>
+          </a:effectRef>
+          <a:fontRef idx="minor">
+            <a:schemeClr val="lt1"/>
+          </a:fontRef>
+        </p:style>
+        <p:txBody>
+          <a:bodyPr rtlCol="0" anchor="ctr"/>
+          <a:lstStyle/>
+          <a:p>
+            <a:pPr algn="ctr"/>
+            <a:endParaRPr lang="zh-TW" altLang="en-US"/>
+          </a:p>
+        </p:txBody>
+      </p:sp>
+      <p:sp>
+        <p:nvSpPr>
+          <p:cNvPr id="15" name="矩形: 圓角 14">
+            <a:extLst>
+              <a:ext uri="{FF2B5EF4-FFF2-40B4-BE49-F238E27FC236}">
+                <a16:creationId xmlns:a16="http://schemas.microsoft.com/office/drawing/2014/main" id="{2D852F25-C5FB-123A-E3F9-23FCC0117E00}"/>
+              </a:ext>
+            </a:extLst>
+          </p:cNvPr>
+          <p:cNvSpPr/>
+          <p:nvPr/>
+        </p:nvSpPr>
+        <p:spPr>
+          <a:xfrm>
+            <a:off x="4577539" y="2960093"/>
+            <a:ext cx="3497778" cy="888007"/>
+          </a:xfrm>
+          <a:prstGeom prst="roundRect">
+            <a:avLst/>
+          </a:prstGeom>
+          <a:ln w="38100"/>
+        </p:spPr>
+        <p:style>
+          <a:lnRef idx="2">
+            <a:schemeClr val="accent1"/>
+          </a:lnRef>
+          <a:fillRef idx="1">
+            <a:schemeClr val="lt1"/>
+          </a:fillRef>
+          <a:effectRef idx="0">
+            <a:schemeClr val="accent1"/>
+          </a:effectRef>
+          <a:fontRef idx="minor">
+            <a:schemeClr val="dk1"/>
+          </a:fontRef>
+        </p:style>
+        <p:txBody>
+          <a:bodyPr rtlCol="0" anchor="ctr"/>
+          <a:lstStyle/>
+          <a:p>
+            <a:pPr algn="ctr"/>
+            <a:r>
+              <a:rPr lang="zh-TW" altLang="en-US" sz="2800" b="1" dirty="0">
+                <a:latin typeface="標楷體" panose="03000509000000000000" pitchFamily="65" charset="-120"/>
+                <a:ea typeface="標楷體" panose="03000509000000000000" pitchFamily="65" charset="-120"/>
+              </a:rPr>
+              <a:t>依筆畫取得各格資料</a:t>
+            </a:r>
+          </a:p>
+        </p:txBody>
+      </p:sp>
+      <p:sp>
+        <p:nvSpPr>
+          <p:cNvPr id="16" name="箭號: 向右 15">
+            <a:extLst>
+              <a:ext uri="{FF2B5EF4-FFF2-40B4-BE49-F238E27FC236}">
+                <a16:creationId xmlns:a16="http://schemas.microsoft.com/office/drawing/2014/main" id="{82104CCD-84F5-6283-E365-E03EE47838C6}"/>
+              </a:ext>
+            </a:extLst>
+          </p:cNvPr>
+          <p:cNvSpPr/>
+          <p:nvPr/>
+        </p:nvSpPr>
+        <p:spPr>
+          <a:xfrm rot="10800000">
+            <a:off x="3019425" y="4769904"/>
+            <a:ext cx="1358972" cy="337843"/>
+          </a:xfrm>
+          <a:prstGeom prst="rightArrow">
+            <a:avLst/>
+          </a:prstGeom>
+        </p:spPr>
+        <p:style>
+          <a:lnRef idx="2">
+            <a:schemeClr val="accent1">
+              <a:shade val="15000"/>
+            </a:schemeClr>
+          </a:lnRef>
+          <a:fillRef idx="1">
+            <a:schemeClr val="accent1"/>
+          </a:fillRef>
+          <a:effectRef idx="0">
+            <a:schemeClr val="accent1"/>
+          </a:effectRef>
+          <a:fontRef idx="minor">
+            <a:schemeClr val="lt1"/>
+          </a:fontRef>
+        </p:style>
+        <p:txBody>
+          <a:bodyPr rtlCol="0" anchor="ctr"/>
+          <a:lstStyle/>
+          <a:p>
+            <a:pPr algn="ctr"/>
+            <a:endParaRPr lang="zh-TW" altLang="en-US"/>
+          </a:p>
+        </p:txBody>
+      </p:sp>
+      <p:sp>
+        <p:nvSpPr>
+          <p:cNvPr id="18" name="矩形: 圓角 17">
+            <a:extLst>
+              <a:ext uri="{FF2B5EF4-FFF2-40B4-BE49-F238E27FC236}">
+                <a16:creationId xmlns:a16="http://schemas.microsoft.com/office/drawing/2014/main" id="{3559CCDF-40BD-52C4-F162-5121905CE23F}"/>
+              </a:ext>
+            </a:extLst>
+          </p:cNvPr>
+          <p:cNvSpPr/>
+          <p:nvPr/>
+        </p:nvSpPr>
+        <p:spPr>
+          <a:xfrm>
+            <a:off x="497070" y="4641553"/>
+            <a:ext cx="2414479" cy="594546"/>
+          </a:xfrm>
+          <a:prstGeom prst="roundRect">
+            <a:avLst/>
+          </a:prstGeom>
+          <a:ln w="38100"/>
+        </p:spPr>
+        <p:style>
+          <a:lnRef idx="2">
+            <a:schemeClr val="accent1"/>
+          </a:lnRef>
+          <a:fillRef idx="1">
+            <a:schemeClr val="lt1"/>
+          </a:fillRef>
+          <a:effectRef idx="0">
+            <a:schemeClr val="accent1"/>
+          </a:effectRef>
+          <a:fontRef idx="minor">
+            <a:schemeClr val="dk1"/>
+          </a:fontRef>
+        </p:style>
+        <p:txBody>
+          <a:bodyPr rtlCol="0" anchor="ctr"/>
+          <a:lstStyle/>
+          <a:p>
+            <a:pPr algn="ctr"/>
+            <a:r>
+              <a:rPr lang="zh-TW" altLang="en-US" sz="2800" b="1" dirty="0">
+                <a:latin typeface="標楷體" panose="03000509000000000000" pitchFamily="65" charset="-120"/>
+                <a:ea typeface="標楷體" panose="03000509000000000000" pitchFamily="65" charset="-120"/>
+              </a:rPr>
+              <a:t>顯示結果</a:t>
+            </a:r>
+          </a:p>
+        </p:txBody>
+      </p:sp>
+      <p:sp>
+        <p:nvSpPr>
+          <p:cNvPr id="10" name="箭號: 向右 9">
+            <a:extLst>
+              <a:ext uri="{FF2B5EF4-FFF2-40B4-BE49-F238E27FC236}">
+                <a16:creationId xmlns:a16="http://schemas.microsoft.com/office/drawing/2014/main" id="{4B9F6657-12DD-C98F-5AE8-E3CD64FB3785}"/>
+              </a:ext>
+            </a:extLst>
+          </p:cNvPr>
+          <p:cNvSpPr/>
+          <p:nvPr/>
+        </p:nvSpPr>
+        <p:spPr>
+          <a:xfrm>
+            <a:off x="8256853" y="2881274"/>
+            <a:ext cx="757346" cy="297918"/>
+          </a:xfrm>
+          <a:prstGeom prst="rightArrow">
+            <a:avLst/>
+          </a:prstGeom>
+        </p:spPr>
+        <p:style>
+          <a:lnRef idx="2">
+            <a:schemeClr val="accent1">
+              <a:shade val="15000"/>
+            </a:schemeClr>
+          </a:lnRef>
+          <a:fillRef idx="1">
+            <a:schemeClr val="accent1"/>
+          </a:fillRef>
+          <a:effectRef idx="0">
+            <a:schemeClr val="accent1"/>
+          </a:effectRef>
+          <a:fontRef idx="minor">
+            <a:schemeClr val="lt1"/>
+          </a:fontRef>
+        </p:style>
+        <p:txBody>
+          <a:bodyPr rtlCol="0" anchor="ctr"/>
+          <a:lstStyle/>
+          <a:p>
+            <a:pPr algn="ctr"/>
+            <a:endParaRPr lang="zh-TW" altLang="en-US"/>
+          </a:p>
+        </p:txBody>
+      </p:sp>
+      <p:sp>
+        <p:nvSpPr>
+          <p:cNvPr id="14" name="矩形: 圓角 13">
+            <a:extLst>
+              <a:ext uri="{FF2B5EF4-FFF2-40B4-BE49-F238E27FC236}">
+                <a16:creationId xmlns:a16="http://schemas.microsoft.com/office/drawing/2014/main" id="{90405E51-22BB-FD8D-996C-7D2AA81EC6D6}"/>
+              </a:ext>
+            </a:extLst>
+          </p:cNvPr>
+          <p:cNvSpPr/>
+          <p:nvPr/>
+        </p:nvSpPr>
+        <p:spPr>
+          <a:xfrm>
+            <a:off x="9303935" y="2900892"/>
+            <a:ext cx="2414479" cy="750673"/>
+          </a:xfrm>
+          <a:prstGeom prst="roundRect">
+            <a:avLst/>
+          </a:prstGeom>
+          <a:ln w="38100"/>
+        </p:spPr>
+        <p:style>
+          <a:lnRef idx="2">
+            <a:schemeClr val="accent1"/>
+          </a:lnRef>
+          <a:fillRef idx="1">
+            <a:schemeClr val="lt1"/>
+          </a:fillRef>
+          <a:effectRef idx="0">
+            <a:schemeClr val="accent1"/>
+          </a:effectRef>
+          <a:fontRef idx="minor">
+            <a:schemeClr val="dk1"/>
+          </a:fontRef>
+        </p:style>
+        <p:txBody>
+          <a:bodyPr rtlCol="0" anchor="ctr"/>
+          <a:lstStyle/>
+          <a:p>
+            <a:pPr algn="ctr"/>
+            <a:r>
+              <a:rPr lang="zh-TW" altLang="en-US" sz="2800" b="1" dirty="0">
+                <a:latin typeface="標楷體" panose="03000509000000000000" pitchFamily="65" charset="-120"/>
+                <a:ea typeface="標楷體" panose="03000509000000000000" pitchFamily="65" charset="-120"/>
+              </a:rPr>
+              <a:t>取得姓名評分</a:t>
+            </a:r>
+          </a:p>
+        </p:txBody>
+      </p:sp>
+      <p:sp>
+        <p:nvSpPr>
+          <p:cNvPr id="17" name="箭號: 向右 16">
+            <a:extLst>
+              <a:ext uri="{FF2B5EF4-FFF2-40B4-BE49-F238E27FC236}">
+                <a16:creationId xmlns:a16="http://schemas.microsoft.com/office/drawing/2014/main" id="{F1CCC61A-528F-9EBD-C23C-2929E4BE6038}"/>
+              </a:ext>
+            </a:extLst>
+          </p:cNvPr>
+          <p:cNvSpPr/>
+          <p:nvPr/>
+        </p:nvSpPr>
+        <p:spPr>
+          <a:xfrm rot="10800000">
+            <a:off x="8235253" y="3350150"/>
+            <a:ext cx="757346" cy="297918"/>
+          </a:xfrm>
+          <a:prstGeom prst="rightArrow">
+            <a:avLst/>
+          </a:prstGeom>
+        </p:spPr>
+        <p:style>
+          <a:lnRef idx="2">
+            <a:schemeClr val="accent1">
+              <a:shade val="15000"/>
+            </a:schemeClr>
+          </a:lnRef>
+          <a:fillRef idx="1">
+            <a:schemeClr val="accent1"/>
+          </a:fillRef>
+          <a:effectRef idx="0">
+            <a:schemeClr val="accent1"/>
+          </a:effectRef>
+          <a:fontRef idx="minor">
+            <a:schemeClr val="lt1"/>
+          </a:fontRef>
+        </p:style>
+        <p:txBody>
+          <a:bodyPr rtlCol="0" anchor="ctr"/>
+          <a:lstStyle/>
+          <a:p>
+            <a:pPr algn="ctr"/>
+            <a:endParaRPr lang="zh-TW" altLang="en-US" dirty="0"/>
+          </a:p>
+        </p:txBody>
+      </p:sp>
+      <p:sp>
+        <p:nvSpPr>
+          <p:cNvPr id="21" name="箭號: 向右 20">
+            <a:extLst>
+              <a:ext uri="{FF2B5EF4-FFF2-40B4-BE49-F238E27FC236}">
+                <a16:creationId xmlns:a16="http://schemas.microsoft.com/office/drawing/2014/main" id="{7371A5FB-D94B-DC7D-1A98-6814B4EF2814}"/>
+              </a:ext>
+            </a:extLst>
+          </p:cNvPr>
+          <p:cNvSpPr/>
+          <p:nvPr/>
+        </p:nvSpPr>
+        <p:spPr>
+          <a:xfrm rot="5400000">
+            <a:off x="6108414" y="3898061"/>
+            <a:ext cx="335571" cy="477800"/>
+          </a:xfrm>
+          <a:prstGeom prst="rightArrow">
+            <a:avLst/>
+          </a:prstGeom>
+        </p:spPr>
+        <p:style>
+          <a:lnRef idx="2">
+            <a:schemeClr val="accent1">
+              <a:shade val="15000"/>
+            </a:schemeClr>
+          </a:lnRef>
+          <a:fillRef idx="1">
+            <a:schemeClr val="accent1"/>
+          </a:fillRef>
+          <a:effectRef idx="0">
+            <a:schemeClr val="accent1"/>
+          </a:effectRef>
+          <a:fontRef idx="minor">
+            <a:schemeClr val="lt1"/>
+          </a:fontRef>
+        </p:style>
+        <p:txBody>
+          <a:bodyPr rtlCol="0" anchor="ctr"/>
+          <a:lstStyle/>
+          <a:p>
+            <a:pPr algn="ctr"/>
+            <a:endParaRPr lang="zh-TW" altLang="en-US"/>
+          </a:p>
+        </p:txBody>
+      </p:sp>
+      <p:sp>
+        <p:nvSpPr>
+          <p:cNvPr id="22" name="矩形: 圓角 21">
+            <a:extLst>
+              <a:ext uri="{FF2B5EF4-FFF2-40B4-BE49-F238E27FC236}">
+                <a16:creationId xmlns:a16="http://schemas.microsoft.com/office/drawing/2014/main" id="{826805B7-FD79-A79E-7970-45686417A9B9}"/>
+              </a:ext>
+            </a:extLst>
+          </p:cNvPr>
+          <p:cNvSpPr/>
+          <p:nvPr/>
+        </p:nvSpPr>
+        <p:spPr>
+          <a:xfrm>
+            <a:off x="4539891" y="4494823"/>
+            <a:ext cx="3497778" cy="888007"/>
+          </a:xfrm>
+          <a:prstGeom prst="roundRect">
+            <a:avLst/>
+          </a:prstGeom>
+          <a:ln w="38100"/>
+        </p:spPr>
+        <p:style>
+          <a:lnRef idx="2">
+            <a:schemeClr val="accent1"/>
+          </a:lnRef>
+          <a:fillRef idx="1">
+            <a:schemeClr val="lt1"/>
+          </a:fillRef>
+          <a:effectRef idx="0">
+            <a:schemeClr val="accent1"/>
+          </a:effectRef>
+          <a:fontRef idx="minor">
+            <a:schemeClr val="dk1"/>
+          </a:fontRef>
+        </p:style>
+        <p:txBody>
+          <a:bodyPr rtlCol="0" anchor="ctr"/>
+          <a:lstStyle/>
+          <a:p>
+            <a:pPr algn="ctr"/>
+            <a:r>
+              <a:rPr lang="zh-TW" altLang="en-US" sz="2800" b="1" dirty="0">
+                <a:latin typeface="標楷體" panose="03000509000000000000" pitchFamily="65" charset="-120"/>
+                <a:ea typeface="標楷體" panose="03000509000000000000" pitchFamily="65" charset="-120"/>
+              </a:rPr>
+              <a:t>資料整理</a:t>
+            </a:r>
+          </a:p>
+        </p:txBody>
+      </p:sp>
+      <p:sp>
+        <p:nvSpPr>
+          <p:cNvPr id="23" name="文字方塊 22">
+            <a:extLst>
+              <a:ext uri="{FF2B5EF4-FFF2-40B4-BE49-F238E27FC236}">
+                <a16:creationId xmlns:a16="http://schemas.microsoft.com/office/drawing/2014/main" id="{5BB1164E-9A2C-E291-956F-CB0E5B4F6529}"/>
+              </a:ext>
+            </a:extLst>
+          </p:cNvPr>
+          <p:cNvSpPr txBox="1"/>
+          <p:nvPr/>
+        </p:nvSpPr>
+        <p:spPr>
+          <a:xfrm>
+            <a:off x="506376" y="191608"/>
+            <a:ext cx="5530924" cy="584775"/>
+          </a:xfrm>
+          <a:prstGeom prst="rect">
+            <a:avLst/>
+          </a:prstGeom>
+          <a:noFill/>
+        </p:spPr>
+        <p:txBody>
+          <a:bodyPr wrap="square" rtlCol="0">
+            <a:spAutoFit/>
+          </a:bodyPr>
+          <a:lstStyle/>
+          <a:p>
+            <a:r>
+              <a:rPr lang="zh-TW" altLang="en-US" sz="3200" b="1" dirty="0">
+                <a:latin typeface="標楷體" panose="03000509000000000000" pitchFamily="65" charset="-120"/>
+                <a:ea typeface="標楷體" panose="03000509000000000000" pitchFamily="65" charset="-120"/>
+              </a:rPr>
+              <a:t>架構說明</a:t>
+            </a:r>
+            <a:r>
+              <a:rPr lang="en-US" altLang="zh-TW" sz="3200" b="1" dirty="0">
+                <a:latin typeface="標楷體" panose="03000509000000000000" pitchFamily="65" charset="-120"/>
+                <a:ea typeface="標楷體" panose="03000509000000000000" pitchFamily="65" charset="-120"/>
+              </a:rPr>
+              <a:t>-</a:t>
+            </a:r>
+            <a:r>
+              <a:rPr lang="zh-TW" altLang="en-US" sz="3200" b="1" dirty="0">
+                <a:latin typeface="標楷體" panose="03000509000000000000" pitchFamily="65" charset="-120"/>
+                <a:ea typeface="標楷體" panose="03000509000000000000" pitchFamily="65" charset="-120"/>
+              </a:rPr>
+              <a:t>姓名分析</a:t>
+            </a:r>
+            <a:endParaRPr lang="zh-TW" altLang="en-US" sz="3200" b="1" dirty="0"/>
+          </a:p>
+        </p:txBody>
+      </p:sp>
+    </p:spTree>
+    <p:extLst>
+      <p:ext uri="{BB962C8B-B14F-4D97-AF65-F5344CB8AC3E}">
+        <p14:creationId xmlns:p14="http://schemas.microsoft.com/office/powerpoint/2010/main" val="3217501419"/>
+      </p:ext>
+    </p:extLst>
+  </p:cSld>
+  <p:clrMapOvr>
+    <a:masterClrMapping/>
+  </p:clrMapOvr>
+  <p:timing>
+    <p:tnLst>
+      <p:par>
+        <p:cTn id="1" dur="indefinite" restart="never" nodeType="tmRoot">
+          <p:childTnLst>
+            <p:seq concurrent="1" nextAc="seek">
+              <p:cTn id="2" dur="indefinite" nodeType="mainSeq">
+                <p:childTnLst>
+                  <p:par>
+                    <p:cTn id="3" fill="hold">
+                      <p:stCondLst>
+                        <p:cond delay="indefinite"/>
+                      </p:stCondLst>
+                      <p:childTnLst>
+                        <p:par>
+                          <p:cTn id="4" fill="hold">
+                            <p:stCondLst>
+                              <p:cond delay="0"/>
+                            </p:stCondLst>
+                            <p:childTnLst>
+                              <p:par>
+                                <p:cTn id="5" presetID="1" presetClass="entr" presetSubtype="0" fill="hold" grpId="0" nodeType="clickEffect">
+                                  <p:stCondLst>
+                                    <p:cond delay="0"/>
+                                  </p:stCondLst>
+                                  <p:childTnLst>
+                                    <p:set>
+                                      <p:cBhvr>
+                                        <p:cTn id="6" dur="1" fill="hold">
+                                          <p:stCondLst>
+                                            <p:cond delay="0"/>
+                                          </p:stCondLst>
+                                        </p:cTn>
+                                        <p:tgtEl>
+                                          <p:spTgt spid="7"/>
+                                        </p:tgtEl>
+                                        <p:attrNameLst>
+                                          <p:attrName>style.visibility</p:attrName>
+                                        </p:attrNameLst>
+                                      </p:cBhvr>
+                                      <p:to>
+                                        <p:strVal val="visible"/>
+                                      </p:to>
+                                    </p:set>
+                                  </p:childTnLst>
+                                </p:cTn>
+                              </p:par>
+                              <p:par>
+                                <p:cTn id="7" presetID="1" presetClass="entr" presetSubtype="0" fill="hold" grpId="0" nodeType="withEffect">
+                                  <p:stCondLst>
+                                    <p:cond delay="0"/>
+                                  </p:stCondLst>
+                                  <p:childTnLst>
+                                    <p:set>
+                                      <p:cBhvr>
+                                        <p:cTn id="8" dur="1" fill="hold">
+                                          <p:stCondLst>
+                                            <p:cond delay="0"/>
+                                          </p:stCondLst>
+                                        </p:cTn>
+                                        <p:tgtEl>
+                                          <p:spTgt spid="8"/>
+                                        </p:tgtEl>
+                                        <p:attrNameLst>
+                                          <p:attrName>style.visibility</p:attrName>
+                                        </p:attrNameLst>
+                                      </p:cBhvr>
+                                      <p:to>
+                                        <p:strVal val="visible"/>
+                                      </p:to>
+                                    </p:set>
+                                  </p:childTnLst>
+                                </p:cTn>
+                              </p:par>
+                            </p:childTnLst>
+                          </p:cTn>
+                        </p:par>
+                      </p:childTnLst>
+                    </p:cTn>
+                  </p:par>
+                  <p:par>
+                    <p:cTn id="9" fill="hold">
+                      <p:stCondLst>
+                        <p:cond delay="indefinite"/>
+                      </p:stCondLst>
+                      <p:childTnLst>
+                        <p:par>
+                          <p:cTn id="10" fill="hold">
+                            <p:stCondLst>
+                              <p:cond delay="0"/>
+                            </p:stCondLst>
+                            <p:childTnLst>
+                              <p:par>
+                                <p:cTn id="11" presetID="1" presetClass="entr" presetSubtype="0" fill="hold" grpId="0" nodeType="clickEffect">
+                                  <p:stCondLst>
+                                    <p:cond delay="0"/>
+                                  </p:stCondLst>
+                                  <p:childTnLst>
+                                    <p:set>
+                                      <p:cBhvr>
+                                        <p:cTn id="12" dur="1" fill="hold">
+                                          <p:stCondLst>
+                                            <p:cond delay="0"/>
+                                          </p:stCondLst>
+                                        </p:cTn>
+                                        <p:tgtEl>
+                                          <p:spTgt spid="9"/>
+                                        </p:tgtEl>
+                                        <p:attrNameLst>
+                                          <p:attrName>style.visibility</p:attrName>
+                                        </p:attrNameLst>
+                                      </p:cBhvr>
+                                      <p:to>
+                                        <p:strVal val="visible"/>
+                                      </p:to>
+                                    </p:set>
+                                  </p:childTnLst>
+                                </p:cTn>
+                              </p:par>
+                              <p:par>
+                                <p:cTn id="13" presetID="1" presetClass="entr" presetSubtype="0" fill="hold" grpId="0" nodeType="withEffect">
+                                  <p:stCondLst>
+                                    <p:cond delay="0"/>
+                                  </p:stCondLst>
+                                  <p:childTnLst>
+                                    <p:set>
+                                      <p:cBhvr>
+                                        <p:cTn id="14" dur="1" fill="hold">
+                                          <p:stCondLst>
+                                            <p:cond delay="0"/>
+                                          </p:stCondLst>
+                                        </p:cTn>
+                                        <p:tgtEl>
+                                          <p:spTgt spid="11"/>
+                                        </p:tgtEl>
+                                        <p:attrNameLst>
+                                          <p:attrName>style.visibility</p:attrName>
+                                        </p:attrNameLst>
+                                      </p:cBhvr>
+                                      <p:to>
+                                        <p:strVal val="visible"/>
+                                      </p:to>
+                                    </p:set>
+                                  </p:childTnLst>
+                                </p:cTn>
+                              </p:par>
+                              <p:par>
+                                <p:cTn id="15" presetID="1" presetClass="entr" presetSubtype="0" fill="hold" grpId="0" nodeType="withEffect">
+                                  <p:stCondLst>
+                                    <p:cond delay="0"/>
+                                  </p:stCondLst>
+                                  <p:childTnLst>
+                                    <p:set>
+                                      <p:cBhvr>
+                                        <p:cTn id="16" dur="1" fill="hold">
+                                          <p:stCondLst>
+                                            <p:cond delay="0"/>
+                                          </p:stCondLst>
+                                        </p:cTn>
+                                        <p:tgtEl>
+                                          <p:spTgt spid="12"/>
+                                        </p:tgtEl>
+                                        <p:attrNameLst>
+                                          <p:attrName>style.visibility</p:attrName>
+                                        </p:attrNameLst>
+                                      </p:cBhvr>
+                                      <p:to>
+                                        <p:strVal val="visible"/>
+                                      </p:to>
+                                    </p:set>
+                                  </p:childTnLst>
+                                </p:cTn>
+                              </p:par>
+                            </p:childTnLst>
+                          </p:cTn>
+                        </p:par>
+                      </p:childTnLst>
+                    </p:cTn>
+                  </p:par>
+                  <p:par>
+                    <p:cTn id="17" fill="hold">
+                      <p:stCondLst>
+                        <p:cond delay="indefinite"/>
+                      </p:stCondLst>
+                      <p:childTnLst>
+                        <p:par>
+                          <p:cTn id="18" fill="hold">
+                            <p:stCondLst>
+                              <p:cond delay="0"/>
+                            </p:stCondLst>
+                            <p:childTnLst>
+                              <p:par>
+                                <p:cTn id="19" presetID="1" presetClass="entr" presetSubtype="0" fill="hold" grpId="0" nodeType="clickEffect">
+                                  <p:stCondLst>
+                                    <p:cond delay="0"/>
+                                  </p:stCondLst>
+                                  <p:childTnLst>
+                                    <p:set>
+                                      <p:cBhvr>
+                                        <p:cTn id="20" dur="1" fill="hold">
+                                          <p:stCondLst>
+                                            <p:cond delay="0"/>
+                                          </p:stCondLst>
+                                        </p:cTn>
+                                        <p:tgtEl>
+                                          <p:spTgt spid="13"/>
+                                        </p:tgtEl>
+                                        <p:attrNameLst>
+                                          <p:attrName>style.visibility</p:attrName>
+                                        </p:attrNameLst>
+                                      </p:cBhvr>
+                                      <p:to>
+                                        <p:strVal val="visible"/>
+                                      </p:to>
+                                    </p:set>
+                                  </p:childTnLst>
+                                </p:cTn>
+                              </p:par>
+                              <p:par>
+                                <p:cTn id="21" presetID="1" presetClass="entr" presetSubtype="0" fill="hold" grpId="0" nodeType="withEffect">
+                                  <p:stCondLst>
+                                    <p:cond delay="0"/>
+                                  </p:stCondLst>
+                                  <p:childTnLst>
+                                    <p:set>
+                                      <p:cBhvr>
+                                        <p:cTn id="22" dur="1" fill="hold">
+                                          <p:stCondLst>
+                                            <p:cond delay="0"/>
+                                          </p:stCondLst>
+                                        </p:cTn>
+                                        <p:tgtEl>
+                                          <p:spTgt spid="15"/>
+                                        </p:tgtEl>
+                                        <p:attrNameLst>
+                                          <p:attrName>style.visibility</p:attrName>
+                                        </p:attrNameLst>
+                                      </p:cBhvr>
+                                      <p:to>
+                                        <p:strVal val="visible"/>
+                                      </p:to>
+                                    </p:set>
+                                  </p:childTnLst>
+                                </p:cTn>
+                              </p:par>
+                            </p:childTnLst>
+                          </p:cTn>
+                        </p:par>
+                      </p:childTnLst>
+                    </p:cTn>
+                  </p:par>
+                  <p:par>
+                    <p:cTn id="23" fill="hold">
+                      <p:stCondLst>
+                        <p:cond delay="indefinite"/>
+                      </p:stCondLst>
+                      <p:childTnLst>
+                        <p:par>
+                          <p:cTn id="24" fill="hold">
+                            <p:stCondLst>
+                              <p:cond delay="0"/>
+                            </p:stCondLst>
+                            <p:childTnLst>
+                              <p:par>
+                                <p:cTn id="25" presetID="1" presetClass="entr" presetSubtype="0" fill="hold" grpId="0" nodeType="clickEffect">
+                                  <p:stCondLst>
+                                    <p:cond delay="0"/>
+                                  </p:stCondLst>
+                                  <p:childTnLst>
+                                    <p:set>
+                                      <p:cBhvr>
+                                        <p:cTn id="26" dur="1" fill="hold">
+                                          <p:stCondLst>
+                                            <p:cond delay="0"/>
+                                          </p:stCondLst>
+                                        </p:cTn>
+                                        <p:tgtEl>
+                                          <p:spTgt spid="10"/>
+                                        </p:tgtEl>
+                                        <p:attrNameLst>
+                                          <p:attrName>style.visibility</p:attrName>
+                                        </p:attrNameLst>
+                                      </p:cBhvr>
+                                      <p:to>
+                                        <p:strVal val="visible"/>
+                                      </p:to>
+                                    </p:set>
+                                  </p:childTnLst>
+                                </p:cTn>
+                              </p:par>
+                              <p:par>
+                                <p:cTn id="27" presetID="1" presetClass="entr" presetSubtype="0" fill="hold" grpId="0" nodeType="withEffect">
+                                  <p:stCondLst>
+                                    <p:cond delay="0"/>
+                                  </p:stCondLst>
+                                  <p:childTnLst>
+                                    <p:set>
+                                      <p:cBhvr>
+                                        <p:cTn id="28" dur="1" fill="hold">
+                                          <p:stCondLst>
+                                            <p:cond delay="0"/>
+                                          </p:stCondLst>
+                                        </p:cTn>
+                                        <p:tgtEl>
+                                          <p:spTgt spid="14"/>
+                                        </p:tgtEl>
+                                        <p:attrNameLst>
+                                          <p:attrName>style.visibility</p:attrName>
+                                        </p:attrNameLst>
+                                      </p:cBhvr>
+                                      <p:to>
+                                        <p:strVal val="visible"/>
+                                      </p:to>
+                                    </p:set>
+                                  </p:childTnLst>
+                                </p:cTn>
+                              </p:par>
+                              <p:par>
+                                <p:cTn id="29" presetID="1" presetClass="entr" presetSubtype="0" fill="hold" grpId="0" nodeType="withEffect">
+                                  <p:stCondLst>
+                                    <p:cond delay="0"/>
+                                  </p:stCondLst>
+                                  <p:childTnLst>
+                                    <p:set>
+                                      <p:cBhvr>
+                                        <p:cTn id="30" dur="1" fill="hold">
+                                          <p:stCondLst>
+                                            <p:cond delay="0"/>
+                                          </p:stCondLst>
+                                        </p:cTn>
+                                        <p:tgtEl>
+                                          <p:spTgt spid="17"/>
+                                        </p:tgtEl>
+                                        <p:attrNameLst>
+                                          <p:attrName>style.visibility</p:attrName>
+                                        </p:attrNameLst>
+                                      </p:cBhvr>
+                                      <p:to>
+                                        <p:strVal val="visible"/>
+                                      </p:to>
+                                    </p:set>
+                                  </p:childTnLst>
+                                </p:cTn>
+                              </p:par>
+                            </p:childTnLst>
+                          </p:cTn>
+                        </p:par>
+                      </p:childTnLst>
+                    </p:cTn>
+                  </p:par>
+                  <p:par>
+                    <p:cTn id="31" fill="hold">
+                      <p:stCondLst>
+                        <p:cond delay="indefinite"/>
+                      </p:stCondLst>
+                      <p:childTnLst>
+                        <p:par>
+                          <p:cTn id="32" fill="hold">
+                            <p:stCondLst>
+                              <p:cond delay="0"/>
+                            </p:stCondLst>
+                            <p:childTnLst>
+                              <p:par>
+                                <p:cTn id="33" presetID="1" presetClass="entr" presetSubtype="0" fill="hold" grpId="0" nodeType="clickEffect">
+                                  <p:stCondLst>
+                                    <p:cond delay="0"/>
+                                  </p:stCondLst>
+                                  <p:childTnLst>
+                                    <p:set>
+                                      <p:cBhvr>
+                                        <p:cTn id="34" dur="1" fill="hold">
+                                          <p:stCondLst>
+                                            <p:cond delay="0"/>
+                                          </p:stCondLst>
+                                        </p:cTn>
+                                        <p:tgtEl>
+                                          <p:spTgt spid="21"/>
+                                        </p:tgtEl>
+                                        <p:attrNameLst>
+                                          <p:attrName>style.visibility</p:attrName>
+                                        </p:attrNameLst>
+                                      </p:cBhvr>
+                                      <p:to>
+                                        <p:strVal val="visible"/>
+                                      </p:to>
+                                    </p:set>
+                                  </p:childTnLst>
+                                </p:cTn>
+                              </p:par>
+                              <p:par>
+                                <p:cTn id="35" presetID="1" presetClass="entr" presetSubtype="0" fill="hold" grpId="0" nodeType="withEffect">
+                                  <p:stCondLst>
+                                    <p:cond delay="0"/>
+                                  </p:stCondLst>
+                                  <p:childTnLst>
+                                    <p:set>
+                                      <p:cBhvr>
+                                        <p:cTn id="36" dur="1" fill="hold">
+                                          <p:stCondLst>
+                                            <p:cond delay="0"/>
+                                          </p:stCondLst>
+                                        </p:cTn>
+                                        <p:tgtEl>
+                                          <p:spTgt spid="22"/>
+                                        </p:tgtEl>
+                                        <p:attrNameLst>
+                                          <p:attrName>style.visibility</p:attrName>
+                                        </p:attrNameLst>
+                                      </p:cBhvr>
+                                      <p:to>
+                                        <p:strVal val="visible"/>
+                                      </p:to>
+                                    </p:set>
+                                  </p:childTnLst>
+                                </p:cTn>
+                              </p:par>
+                            </p:childTnLst>
+                          </p:cTn>
+                        </p:par>
+                      </p:childTnLst>
+                    </p:cTn>
+                  </p:par>
+                  <p:par>
+                    <p:cTn id="37" fill="hold">
+                      <p:stCondLst>
+                        <p:cond delay="indefinite"/>
+                      </p:stCondLst>
+                      <p:childTnLst>
+                        <p:par>
+                          <p:cTn id="38" fill="hold">
+                            <p:stCondLst>
+                              <p:cond delay="0"/>
+                            </p:stCondLst>
+                            <p:childTnLst>
+                              <p:par>
+                                <p:cTn id="39" presetID="1" presetClass="entr" presetSubtype="0" fill="hold" grpId="0" nodeType="clickEffect">
+                                  <p:stCondLst>
+                                    <p:cond delay="0"/>
+                                  </p:stCondLst>
+                                  <p:childTnLst>
+                                    <p:set>
+                                      <p:cBhvr>
+                                        <p:cTn id="40" dur="1" fill="hold">
+                                          <p:stCondLst>
+                                            <p:cond delay="0"/>
+                                          </p:stCondLst>
+                                        </p:cTn>
+                                        <p:tgtEl>
+                                          <p:spTgt spid="16"/>
+                                        </p:tgtEl>
+                                        <p:attrNameLst>
+                                          <p:attrName>style.visibility</p:attrName>
+                                        </p:attrNameLst>
+                                      </p:cBhvr>
+                                      <p:to>
+                                        <p:strVal val="visible"/>
+                                      </p:to>
+                                    </p:set>
+                                  </p:childTnLst>
+                                </p:cTn>
+                              </p:par>
+                              <p:par>
+                                <p:cTn id="41" presetID="1" presetClass="entr" presetSubtype="0" fill="hold" grpId="0" nodeType="withEffect">
+                                  <p:stCondLst>
+                                    <p:cond delay="0"/>
+                                  </p:stCondLst>
+                                  <p:childTnLst>
+                                    <p:set>
+                                      <p:cBhvr>
+                                        <p:cTn id="42" dur="1" fill="hold">
+                                          <p:stCondLst>
+                                            <p:cond delay="0"/>
+                                          </p:stCondLst>
+                                        </p:cTn>
+                                        <p:tgtEl>
+                                          <p:spTgt spid="18"/>
+                                        </p:tgtEl>
+                                        <p:attrNameLst>
+                                          <p:attrName>style.visibility</p:attrName>
+                                        </p:attrNameLst>
+                                      </p:cBhvr>
+                                      <p:to>
+                                        <p:strVal val="visible"/>
+                                      </p:to>
+                                    </p:set>
+                                  </p:childTnLst>
+                                </p:cTn>
+                              </p:par>
+                            </p:childTnLst>
+                          </p:cTn>
+                        </p:par>
+                      </p:childTnLst>
+                    </p:cTn>
+                  </p:par>
+                </p:childTnLst>
+              </p:cTn>
+              <p:prevCondLst>
+                <p:cond evt="onPrev" delay="0">
+                  <p:tgtEl>
+                    <p:sldTgt/>
+                  </p:tgtEl>
+                </p:cond>
+              </p:prevCondLst>
+              <p:nextCondLst>
+                <p:cond evt="onNext" delay="0">
+                  <p:tgtEl>
+                    <p:sldTgt/>
+                  </p:tgtEl>
+                </p:cond>
+              </p:nextCondLst>
+            </p:seq>
+          </p:childTnLst>
+        </p:cTn>
+      </p:par>
+    </p:tnLst>
+    <p:bldLst>
+      <p:bldP spid="7" grpId="0" animBg="1"/>
+      <p:bldP spid="8" grpId="0" animBg="1"/>
+      <p:bldP spid="9" grpId="0" animBg="1"/>
+      <p:bldP spid="11" grpId="0" animBg="1"/>
+      <p:bldP spid="12" grpId="0" animBg="1"/>
+      <p:bldP spid="13" grpId="0" animBg="1"/>
+      <p:bldP spid="15" grpId="0" animBg="1"/>
+      <p:bldP spid="16" grpId="0" animBg="1"/>
+      <p:bldP spid="18" grpId="0" animBg="1"/>
+      <p:bldP spid="10" grpId="0" animBg="1"/>
+      <p:bldP spid="14" grpId="0" animBg="1"/>
+      <p:bldP spid="17" grpId="0" animBg="1"/>
+      <p:bldP spid="21" grpId="0" animBg="1"/>
+      <p:bldP spid="22" grpId="0" animBg="1"/>
+    </p:bldLst>
+  </p:timing>
+</p:sld>
+</file>
+
+<file path=ppt/slides/slide7.xml><?xml version="1.0" encoding="utf-8"?>
 <p:sld xmlns:a="http://schemas.openxmlformats.org/drawingml/2006/main" xmlns:r="http://schemas.openxmlformats.org/officeDocument/2006/relationships" xmlns:p="http://schemas.openxmlformats.org/presentationml/2006/main">
   <p:cSld>
     <p:spTree>
@@ -7711,1499 +9301,6 @@
 </p:sld>
 </file>
 
-<file path=ppt/slides/slide7.xml><?xml version="1.0" encoding="utf-8"?>
-<p:sld xmlns:a="http://schemas.openxmlformats.org/drawingml/2006/main" xmlns:r="http://schemas.openxmlformats.org/officeDocument/2006/relationships" xmlns:p="http://schemas.openxmlformats.org/presentationml/2006/main">
-  <p:cSld>
-    <p:spTree>
-      <p:nvGrpSpPr>
-        <p:cNvPr id="1" name=""/>
-        <p:cNvGrpSpPr/>
-        <p:nvPr/>
-      </p:nvGrpSpPr>
-      <p:grpSpPr>
-        <a:xfrm>
-          <a:off x="0" y="0"/>
-          <a:ext cx="0" cy="0"/>
-          <a:chOff x="0" y="0"/>
-          <a:chExt cx="0" cy="0"/>
-        </a:xfrm>
-      </p:grpSpPr>
-      <p:sp>
-        <p:nvSpPr>
-          <p:cNvPr id="2" name="矩形: 圓角 1">
-            <a:extLst>
-              <a:ext uri="{FF2B5EF4-FFF2-40B4-BE49-F238E27FC236}">
-                <a16:creationId xmlns:a16="http://schemas.microsoft.com/office/drawing/2014/main" id="{ECC3DB5C-A9E8-FF41-0C23-A63318979377}"/>
-              </a:ext>
-            </a:extLst>
-          </p:cNvPr>
-          <p:cNvSpPr/>
-          <p:nvPr/>
-        </p:nvSpPr>
-        <p:spPr>
-          <a:xfrm>
-            <a:off x="832440" y="843072"/>
-            <a:ext cx="1743740" cy="701750"/>
-          </a:xfrm>
-          <a:prstGeom prst="roundRect">
-            <a:avLst/>
-          </a:prstGeom>
-          <a:ln w="38100"/>
-        </p:spPr>
-        <p:style>
-          <a:lnRef idx="2">
-            <a:schemeClr val="accent6"/>
-          </a:lnRef>
-          <a:fillRef idx="1">
-            <a:schemeClr val="lt1"/>
-          </a:fillRef>
-          <a:effectRef idx="0">
-            <a:schemeClr val="accent6"/>
-          </a:effectRef>
-          <a:fontRef idx="minor">
-            <a:schemeClr val="dk1"/>
-          </a:fontRef>
-        </p:style>
-        <p:txBody>
-          <a:bodyPr rtlCol="0" anchor="ctr"/>
-          <a:lstStyle/>
-          <a:p>
-            <a:pPr algn="ctr"/>
-            <a:r>
-              <a:rPr lang="zh-TW" altLang="en-US" sz="2800" b="1" dirty="0">
-                <a:latin typeface="標楷體" panose="03000509000000000000" pitchFamily="65" charset="-120"/>
-                <a:ea typeface="標楷體" panose="03000509000000000000" pitchFamily="65" charset="-120"/>
-              </a:rPr>
-              <a:t>頁面</a:t>
-            </a:r>
-          </a:p>
-        </p:txBody>
-      </p:sp>
-      <p:sp>
-        <p:nvSpPr>
-          <p:cNvPr id="3" name="矩形: 圓角 2">
-            <a:extLst>
-              <a:ext uri="{FF2B5EF4-FFF2-40B4-BE49-F238E27FC236}">
-                <a16:creationId xmlns:a16="http://schemas.microsoft.com/office/drawing/2014/main" id="{C1E49841-E41C-6D2E-B34F-5B1256EE002F}"/>
-              </a:ext>
-            </a:extLst>
-          </p:cNvPr>
-          <p:cNvSpPr/>
-          <p:nvPr/>
-        </p:nvSpPr>
-        <p:spPr>
-          <a:xfrm>
-            <a:off x="5512758" y="798364"/>
-            <a:ext cx="1743740" cy="701750"/>
-          </a:xfrm>
-          <a:prstGeom prst="roundRect">
-            <a:avLst/>
-          </a:prstGeom>
-          <a:ln w="38100"/>
-        </p:spPr>
-        <p:style>
-          <a:lnRef idx="2">
-            <a:schemeClr val="accent6"/>
-          </a:lnRef>
-          <a:fillRef idx="1">
-            <a:schemeClr val="lt1"/>
-          </a:fillRef>
-          <a:effectRef idx="0">
-            <a:schemeClr val="accent6"/>
-          </a:effectRef>
-          <a:fontRef idx="minor">
-            <a:schemeClr val="dk1"/>
-          </a:fontRef>
-        </p:style>
-        <p:txBody>
-          <a:bodyPr rtlCol="0" anchor="ctr"/>
-          <a:lstStyle/>
-          <a:p>
-            <a:pPr algn="ctr"/>
-            <a:r>
-              <a:rPr lang="zh-TW" altLang="en-US" sz="2800" b="1" dirty="0">
-                <a:latin typeface="標楷體" panose="03000509000000000000" pitchFamily="65" charset="-120"/>
-                <a:ea typeface="標楷體" panose="03000509000000000000" pitchFamily="65" charset="-120"/>
-              </a:rPr>
-              <a:t>伺服器</a:t>
-            </a:r>
-          </a:p>
-        </p:txBody>
-      </p:sp>
-      <p:sp>
-        <p:nvSpPr>
-          <p:cNvPr id="4" name="矩形: 圓角 3">
-            <a:extLst>
-              <a:ext uri="{FF2B5EF4-FFF2-40B4-BE49-F238E27FC236}">
-                <a16:creationId xmlns:a16="http://schemas.microsoft.com/office/drawing/2014/main" id="{B8EEB4A2-7A52-A3B0-2947-560C20CE3C31}"/>
-              </a:ext>
-            </a:extLst>
-          </p:cNvPr>
-          <p:cNvSpPr/>
-          <p:nvPr/>
-        </p:nvSpPr>
-        <p:spPr>
-          <a:xfrm>
-            <a:off x="9324309" y="843072"/>
-            <a:ext cx="1743740" cy="701750"/>
-          </a:xfrm>
-          <a:prstGeom prst="roundRect">
-            <a:avLst/>
-          </a:prstGeom>
-          <a:ln w="38100"/>
-        </p:spPr>
-        <p:style>
-          <a:lnRef idx="2">
-            <a:schemeClr val="accent6"/>
-          </a:lnRef>
-          <a:fillRef idx="1">
-            <a:schemeClr val="lt1"/>
-          </a:fillRef>
-          <a:effectRef idx="0">
-            <a:schemeClr val="accent6"/>
-          </a:effectRef>
-          <a:fontRef idx="minor">
-            <a:schemeClr val="dk1"/>
-          </a:fontRef>
-        </p:style>
-        <p:txBody>
-          <a:bodyPr rtlCol="0" anchor="ctr"/>
-          <a:lstStyle/>
-          <a:p>
-            <a:pPr algn="ctr"/>
-            <a:r>
-              <a:rPr lang="zh-TW" altLang="en-US" sz="2800" b="1" dirty="0">
-                <a:latin typeface="標楷體" panose="03000509000000000000" pitchFamily="65" charset="-120"/>
-                <a:ea typeface="標楷體" panose="03000509000000000000" pitchFamily="65" charset="-120"/>
-              </a:rPr>
-              <a:t>資料庫</a:t>
-            </a:r>
-          </a:p>
-        </p:txBody>
-      </p:sp>
-      <p:sp>
-        <p:nvSpPr>
-          <p:cNvPr id="6" name="矩形: 圓角 5">
-            <a:extLst>
-              <a:ext uri="{FF2B5EF4-FFF2-40B4-BE49-F238E27FC236}">
-                <a16:creationId xmlns:a16="http://schemas.microsoft.com/office/drawing/2014/main" id="{B1ADD0E5-2D4C-3257-DFF2-8AAF7B3680E0}"/>
-              </a:ext>
-            </a:extLst>
-          </p:cNvPr>
-          <p:cNvSpPr/>
-          <p:nvPr/>
-        </p:nvSpPr>
-        <p:spPr>
-          <a:xfrm>
-            <a:off x="570170" y="1846076"/>
-            <a:ext cx="2268280" cy="578846"/>
-          </a:xfrm>
-          <a:prstGeom prst="roundRect">
-            <a:avLst/>
-          </a:prstGeom>
-          <a:ln w="38100"/>
-        </p:spPr>
-        <p:style>
-          <a:lnRef idx="2">
-            <a:schemeClr val="accent1"/>
-          </a:lnRef>
-          <a:fillRef idx="1">
-            <a:schemeClr val="lt1"/>
-          </a:fillRef>
-          <a:effectRef idx="0">
-            <a:schemeClr val="accent1"/>
-          </a:effectRef>
-          <a:fontRef idx="minor">
-            <a:schemeClr val="dk1"/>
-          </a:fontRef>
-        </p:style>
-        <p:txBody>
-          <a:bodyPr rtlCol="0" anchor="ctr"/>
-          <a:lstStyle/>
-          <a:p>
-            <a:pPr algn="ctr"/>
-            <a:r>
-              <a:rPr lang="zh-TW" altLang="en-US" sz="2800" b="1" dirty="0">
-                <a:latin typeface="標楷體" panose="03000509000000000000" pitchFamily="65" charset="-120"/>
-                <a:ea typeface="標楷體" panose="03000509000000000000" pitchFamily="65" charset="-120"/>
-              </a:rPr>
-              <a:t>輸入姓名</a:t>
-            </a:r>
-          </a:p>
-        </p:txBody>
-      </p:sp>
-      <p:sp>
-        <p:nvSpPr>
-          <p:cNvPr id="7" name="箭號: 向右 6">
-            <a:extLst>
-              <a:ext uri="{FF2B5EF4-FFF2-40B4-BE49-F238E27FC236}">
-                <a16:creationId xmlns:a16="http://schemas.microsoft.com/office/drawing/2014/main" id="{DE604356-48D0-362A-3BF3-73B8C6A6478E}"/>
-              </a:ext>
-            </a:extLst>
-          </p:cNvPr>
-          <p:cNvSpPr/>
-          <p:nvPr/>
-        </p:nvSpPr>
-        <p:spPr>
-          <a:xfrm>
-            <a:off x="3019426" y="1915629"/>
-            <a:ext cx="1466849" cy="337843"/>
-          </a:xfrm>
-          <a:prstGeom prst="rightArrow">
-            <a:avLst/>
-          </a:prstGeom>
-        </p:spPr>
-        <p:style>
-          <a:lnRef idx="2">
-            <a:schemeClr val="accent1">
-              <a:shade val="15000"/>
-            </a:schemeClr>
-          </a:lnRef>
-          <a:fillRef idx="1">
-            <a:schemeClr val="accent1"/>
-          </a:fillRef>
-          <a:effectRef idx="0">
-            <a:schemeClr val="accent1"/>
-          </a:effectRef>
-          <a:fontRef idx="minor">
-            <a:schemeClr val="lt1"/>
-          </a:fontRef>
-        </p:style>
-        <p:txBody>
-          <a:bodyPr rtlCol="0" anchor="ctr"/>
-          <a:lstStyle/>
-          <a:p>
-            <a:pPr algn="ctr"/>
-            <a:endParaRPr lang="zh-TW" altLang="en-US"/>
-          </a:p>
-        </p:txBody>
-      </p:sp>
-      <p:sp>
-        <p:nvSpPr>
-          <p:cNvPr id="8" name="矩形: 圓角 7">
-            <a:extLst>
-              <a:ext uri="{FF2B5EF4-FFF2-40B4-BE49-F238E27FC236}">
-                <a16:creationId xmlns:a16="http://schemas.microsoft.com/office/drawing/2014/main" id="{58F7607A-455D-3416-9F4E-C1F0A37259D3}"/>
-              </a:ext>
-            </a:extLst>
-          </p:cNvPr>
-          <p:cNvSpPr/>
-          <p:nvPr/>
-        </p:nvSpPr>
-        <p:spPr>
-          <a:xfrm>
-            <a:off x="4606114" y="1846077"/>
-            <a:ext cx="3240272" cy="578846"/>
-          </a:xfrm>
-          <a:prstGeom prst="roundRect">
-            <a:avLst/>
-          </a:prstGeom>
-          <a:ln w="38100"/>
-        </p:spPr>
-        <p:style>
-          <a:lnRef idx="2">
-            <a:schemeClr val="accent1"/>
-          </a:lnRef>
-          <a:fillRef idx="1">
-            <a:schemeClr val="lt1"/>
-          </a:fillRef>
-          <a:effectRef idx="0">
-            <a:schemeClr val="accent1"/>
-          </a:effectRef>
-          <a:fontRef idx="minor">
-            <a:schemeClr val="dk1"/>
-          </a:fontRef>
-        </p:style>
-        <p:txBody>
-          <a:bodyPr rtlCol="0" anchor="ctr"/>
-          <a:lstStyle/>
-          <a:p>
-            <a:pPr algn="ctr"/>
-            <a:r>
-              <a:rPr lang="zh-TW" altLang="en-US" sz="2800" b="1" dirty="0">
-                <a:latin typeface="標楷體" panose="03000509000000000000" pitchFamily="65" charset="-120"/>
-                <a:ea typeface="標楷體" panose="03000509000000000000" pitchFamily="65" charset="-120"/>
-              </a:rPr>
-              <a:t>向資料庫查詢筆畫</a:t>
-            </a:r>
-          </a:p>
-        </p:txBody>
-      </p:sp>
-      <p:sp>
-        <p:nvSpPr>
-          <p:cNvPr id="9" name="箭號: 向右 8">
-            <a:extLst>
-              <a:ext uri="{FF2B5EF4-FFF2-40B4-BE49-F238E27FC236}">
-                <a16:creationId xmlns:a16="http://schemas.microsoft.com/office/drawing/2014/main" id="{606F9C8B-1B04-F4CA-94B1-127D7516EEA8}"/>
-              </a:ext>
-            </a:extLst>
-          </p:cNvPr>
-          <p:cNvSpPr/>
-          <p:nvPr/>
-        </p:nvSpPr>
-        <p:spPr>
-          <a:xfrm>
-            <a:off x="8125492" y="1721306"/>
-            <a:ext cx="757346" cy="297918"/>
-          </a:xfrm>
-          <a:prstGeom prst="rightArrow">
-            <a:avLst/>
-          </a:prstGeom>
-        </p:spPr>
-        <p:style>
-          <a:lnRef idx="2">
-            <a:schemeClr val="accent1">
-              <a:shade val="15000"/>
-            </a:schemeClr>
-          </a:lnRef>
-          <a:fillRef idx="1">
-            <a:schemeClr val="accent1"/>
-          </a:fillRef>
-          <a:effectRef idx="0">
-            <a:schemeClr val="accent1"/>
-          </a:effectRef>
-          <a:fontRef idx="minor">
-            <a:schemeClr val="lt1"/>
-          </a:fontRef>
-        </p:style>
-        <p:txBody>
-          <a:bodyPr rtlCol="0" anchor="ctr"/>
-          <a:lstStyle/>
-          <a:p>
-            <a:pPr algn="ctr"/>
-            <a:endParaRPr lang="zh-TW" altLang="en-US"/>
-          </a:p>
-        </p:txBody>
-      </p:sp>
-      <p:sp>
-        <p:nvSpPr>
-          <p:cNvPr id="11" name="矩形: 圓角 10">
-            <a:extLst>
-              <a:ext uri="{FF2B5EF4-FFF2-40B4-BE49-F238E27FC236}">
-                <a16:creationId xmlns:a16="http://schemas.microsoft.com/office/drawing/2014/main" id="{F5BAE114-57EB-4D64-F84F-5741E2F0088D}"/>
-              </a:ext>
-            </a:extLst>
-          </p:cNvPr>
-          <p:cNvSpPr/>
-          <p:nvPr/>
-        </p:nvSpPr>
-        <p:spPr>
-          <a:xfrm>
-            <a:off x="9172574" y="1674249"/>
-            <a:ext cx="2414479" cy="750673"/>
-          </a:xfrm>
-          <a:prstGeom prst="roundRect">
-            <a:avLst/>
-          </a:prstGeom>
-          <a:ln w="38100"/>
-        </p:spPr>
-        <p:style>
-          <a:lnRef idx="2">
-            <a:schemeClr val="accent1"/>
-          </a:lnRef>
-          <a:fillRef idx="1">
-            <a:schemeClr val="lt1"/>
-          </a:fillRef>
-          <a:effectRef idx="0">
-            <a:schemeClr val="accent1"/>
-          </a:effectRef>
-          <a:fontRef idx="minor">
-            <a:schemeClr val="dk1"/>
-          </a:fontRef>
-        </p:style>
-        <p:txBody>
-          <a:bodyPr rtlCol="0" anchor="ctr"/>
-          <a:lstStyle/>
-          <a:p>
-            <a:pPr algn="ctr"/>
-            <a:r>
-              <a:rPr lang="zh-TW" altLang="en-US" sz="2800" b="1" dirty="0">
-                <a:latin typeface="標楷體" panose="03000509000000000000" pitchFamily="65" charset="-120"/>
-                <a:ea typeface="標楷體" panose="03000509000000000000" pitchFamily="65" charset="-120"/>
-              </a:rPr>
-              <a:t>搜尋筆畫</a:t>
-            </a:r>
-          </a:p>
-        </p:txBody>
-      </p:sp>
-      <p:sp>
-        <p:nvSpPr>
-          <p:cNvPr id="12" name="箭號: 向右 11">
-            <a:extLst>
-              <a:ext uri="{FF2B5EF4-FFF2-40B4-BE49-F238E27FC236}">
-                <a16:creationId xmlns:a16="http://schemas.microsoft.com/office/drawing/2014/main" id="{8AA6A847-37E4-EE1C-9234-08A8A81084D5}"/>
-              </a:ext>
-            </a:extLst>
-          </p:cNvPr>
-          <p:cNvSpPr/>
-          <p:nvPr/>
-        </p:nvSpPr>
-        <p:spPr>
-          <a:xfrm rot="10800000">
-            <a:off x="8103892" y="2190182"/>
-            <a:ext cx="757346" cy="297918"/>
-          </a:xfrm>
-          <a:prstGeom prst="rightArrow">
-            <a:avLst/>
-          </a:prstGeom>
-        </p:spPr>
-        <p:style>
-          <a:lnRef idx="2">
-            <a:schemeClr val="accent1">
-              <a:shade val="15000"/>
-            </a:schemeClr>
-          </a:lnRef>
-          <a:fillRef idx="1">
-            <a:schemeClr val="accent1"/>
-          </a:fillRef>
-          <a:effectRef idx="0">
-            <a:schemeClr val="accent1"/>
-          </a:effectRef>
-          <a:fontRef idx="minor">
-            <a:schemeClr val="lt1"/>
-          </a:fontRef>
-        </p:style>
-        <p:txBody>
-          <a:bodyPr rtlCol="0" anchor="ctr"/>
-          <a:lstStyle/>
-          <a:p>
-            <a:pPr algn="ctr"/>
-            <a:endParaRPr lang="zh-TW" altLang="en-US" dirty="0"/>
-          </a:p>
-        </p:txBody>
-      </p:sp>
-      <p:sp>
-        <p:nvSpPr>
-          <p:cNvPr id="13" name="箭號: 向右 12">
-            <a:extLst>
-              <a:ext uri="{FF2B5EF4-FFF2-40B4-BE49-F238E27FC236}">
-                <a16:creationId xmlns:a16="http://schemas.microsoft.com/office/drawing/2014/main" id="{C7A0647B-46D2-9D53-3580-1F6FD5239A62}"/>
-              </a:ext>
-            </a:extLst>
-          </p:cNvPr>
-          <p:cNvSpPr/>
-          <p:nvPr/>
-        </p:nvSpPr>
-        <p:spPr>
-          <a:xfrm rot="5400000">
-            <a:off x="6108414" y="2427531"/>
-            <a:ext cx="335571" cy="477800"/>
-          </a:xfrm>
-          <a:prstGeom prst="rightArrow">
-            <a:avLst/>
-          </a:prstGeom>
-        </p:spPr>
-        <p:style>
-          <a:lnRef idx="2">
-            <a:schemeClr val="accent1">
-              <a:shade val="15000"/>
-            </a:schemeClr>
-          </a:lnRef>
-          <a:fillRef idx="1">
-            <a:schemeClr val="accent1"/>
-          </a:fillRef>
-          <a:effectRef idx="0">
-            <a:schemeClr val="accent1"/>
-          </a:effectRef>
-          <a:fontRef idx="minor">
-            <a:schemeClr val="lt1"/>
-          </a:fontRef>
-        </p:style>
-        <p:txBody>
-          <a:bodyPr rtlCol="0" anchor="ctr"/>
-          <a:lstStyle/>
-          <a:p>
-            <a:pPr algn="ctr"/>
-            <a:endParaRPr lang="zh-TW" altLang="en-US"/>
-          </a:p>
-        </p:txBody>
-      </p:sp>
-      <p:sp>
-        <p:nvSpPr>
-          <p:cNvPr id="15" name="矩形: 圓角 14">
-            <a:extLst>
-              <a:ext uri="{FF2B5EF4-FFF2-40B4-BE49-F238E27FC236}">
-                <a16:creationId xmlns:a16="http://schemas.microsoft.com/office/drawing/2014/main" id="{2D852F25-C5FB-123A-E3F9-23FCC0117E00}"/>
-              </a:ext>
-            </a:extLst>
-          </p:cNvPr>
-          <p:cNvSpPr/>
-          <p:nvPr/>
-        </p:nvSpPr>
-        <p:spPr>
-          <a:xfrm>
-            <a:off x="4577539" y="2960093"/>
-            <a:ext cx="3497778" cy="888007"/>
-          </a:xfrm>
-          <a:prstGeom prst="roundRect">
-            <a:avLst/>
-          </a:prstGeom>
-          <a:ln w="38100"/>
-        </p:spPr>
-        <p:style>
-          <a:lnRef idx="2">
-            <a:schemeClr val="accent1"/>
-          </a:lnRef>
-          <a:fillRef idx="1">
-            <a:schemeClr val="lt1"/>
-          </a:fillRef>
-          <a:effectRef idx="0">
-            <a:schemeClr val="accent1"/>
-          </a:effectRef>
-          <a:fontRef idx="minor">
-            <a:schemeClr val="dk1"/>
-          </a:fontRef>
-        </p:style>
-        <p:txBody>
-          <a:bodyPr rtlCol="0" anchor="ctr"/>
-          <a:lstStyle/>
-          <a:p>
-            <a:pPr algn="ctr"/>
-            <a:r>
-              <a:rPr lang="zh-TW" altLang="en-US" sz="2800" b="1" dirty="0">
-                <a:latin typeface="標楷體" panose="03000509000000000000" pitchFamily="65" charset="-120"/>
-                <a:ea typeface="標楷體" panose="03000509000000000000" pitchFamily="65" charset="-120"/>
-              </a:rPr>
-              <a:t>依筆畫取得各格資料</a:t>
-            </a:r>
-          </a:p>
-        </p:txBody>
-      </p:sp>
-      <p:sp>
-        <p:nvSpPr>
-          <p:cNvPr id="16" name="箭號: 向右 15">
-            <a:extLst>
-              <a:ext uri="{FF2B5EF4-FFF2-40B4-BE49-F238E27FC236}">
-                <a16:creationId xmlns:a16="http://schemas.microsoft.com/office/drawing/2014/main" id="{82104CCD-84F5-6283-E365-E03EE47838C6}"/>
-              </a:ext>
-            </a:extLst>
-          </p:cNvPr>
-          <p:cNvSpPr/>
-          <p:nvPr/>
-        </p:nvSpPr>
-        <p:spPr>
-          <a:xfrm rot="10800000">
-            <a:off x="3019425" y="4769904"/>
-            <a:ext cx="1358972" cy="337843"/>
-          </a:xfrm>
-          <a:prstGeom prst="rightArrow">
-            <a:avLst/>
-          </a:prstGeom>
-        </p:spPr>
-        <p:style>
-          <a:lnRef idx="2">
-            <a:schemeClr val="accent1">
-              <a:shade val="15000"/>
-            </a:schemeClr>
-          </a:lnRef>
-          <a:fillRef idx="1">
-            <a:schemeClr val="accent1"/>
-          </a:fillRef>
-          <a:effectRef idx="0">
-            <a:schemeClr val="accent1"/>
-          </a:effectRef>
-          <a:fontRef idx="minor">
-            <a:schemeClr val="lt1"/>
-          </a:fontRef>
-        </p:style>
-        <p:txBody>
-          <a:bodyPr rtlCol="0" anchor="ctr"/>
-          <a:lstStyle/>
-          <a:p>
-            <a:pPr algn="ctr"/>
-            <a:endParaRPr lang="zh-TW" altLang="en-US"/>
-          </a:p>
-        </p:txBody>
-      </p:sp>
-      <p:sp>
-        <p:nvSpPr>
-          <p:cNvPr id="18" name="矩形: 圓角 17">
-            <a:extLst>
-              <a:ext uri="{FF2B5EF4-FFF2-40B4-BE49-F238E27FC236}">
-                <a16:creationId xmlns:a16="http://schemas.microsoft.com/office/drawing/2014/main" id="{3559CCDF-40BD-52C4-F162-5121905CE23F}"/>
-              </a:ext>
-            </a:extLst>
-          </p:cNvPr>
-          <p:cNvSpPr/>
-          <p:nvPr/>
-        </p:nvSpPr>
-        <p:spPr>
-          <a:xfrm>
-            <a:off x="497070" y="4641553"/>
-            <a:ext cx="2414479" cy="594546"/>
-          </a:xfrm>
-          <a:prstGeom prst="roundRect">
-            <a:avLst/>
-          </a:prstGeom>
-          <a:ln w="38100"/>
-        </p:spPr>
-        <p:style>
-          <a:lnRef idx="2">
-            <a:schemeClr val="accent1"/>
-          </a:lnRef>
-          <a:fillRef idx="1">
-            <a:schemeClr val="lt1"/>
-          </a:fillRef>
-          <a:effectRef idx="0">
-            <a:schemeClr val="accent1"/>
-          </a:effectRef>
-          <a:fontRef idx="minor">
-            <a:schemeClr val="dk1"/>
-          </a:fontRef>
-        </p:style>
-        <p:txBody>
-          <a:bodyPr rtlCol="0" anchor="ctr"/>
-          <a:lstStyle/>
-          <a:p>
-            <a:pPr algn="ctr"/>
-            <a:r>
-              <a:rPr lang="zh-TW" altLang="en-US" sz="2800" b="1" dirty="0">
-                <a:latin typeface="標楷體" panose="03000509000000000000" pitchFamily="65" charset="-120"/>
-                <a:ea typeface="標楷體" panose="03000509000000000000" pitchFamily="65" charset="-120"/>
-              </a:rPr>
-              <a:t>顯示結果</a:t>
-            </a:r>
-          </a:p>
-        </p:txBody>
-      </p:sp>
-      <p:sp>
-        <p:nvSpPr>
-          <p:cNvPr id="10" name="箭號: 向右 9">
-            <a:extLst>
-              <a:ext uri="{FF2B5EF4-FFF2-40B4-BE49-F238E27FC236}">
-                <a16:creationId xmlns:a16="http://schemas.microsoft.com/office/drawing/2014/main" id="{4B9F6657-12DD-C98F-5AE8-E3CD64FB3785}"/>
-              </a:ext>
-            </a:extLst>
-          </p:cNvPr>
-          <p:cNvSpPr/>
-          <p:nvPr/>
-        </p:nvSpPr>
-        <p:spPr>
-          <a:xfrm>
-            <a:off x="8256853" y="2881274"/>
-            <a:ext cx="757346" cy="297918"/>
-          </a:xfrm>
-          <a:prstGeom prst="rightArrow">
-            <a:avLst/>
-          </a:prstGeom>
-        </p:spPr>
-        <p:style>
-          <a:lnRef idx="2">
-            <a:schemeClr val="accent1">
-              <a:shade val="15000"/>
-            </a:schemeClr>
-          </a:lnRef>
-          <a:fillRef idx="1">
-            <a:schemeClr val="accent1"/>
-          </a:fillRef>
-          <a:effectRef idx="0">
-            <a:schemeClr val="accent1"/>
-          </a:effectRef>
-          <a:fontRef idx="minor">
-            <a:schemeClr val="lt1"/>
-          </a:fontRef>
-        </p:style>
-        <p:txBody>
-          <a:bodyPr rtlCol="0" anchor="ctr"/>
-          <a:lstStyle/>
-          <a:p>
-            <a:pPr algn="ctr"/>
-            <a:endParaRPr lang="zh-TW" altLang="en-US"/>
-          </a:p>
-        </p:txBody>
-      </p:sp>
-      <p:sp>
-        <p:nvSpPr>
-          <p:cNvPr id="14" name="矩形: 圓角 13">
-            <a:extLst>
-              <a:ext uri="{FF2B5EF4-FFF2-40B4-BE49-F238E27FC236}">
-                <a16:creationId xmlns:a16="http://schemas.microsoft.com/office/drawing/2014/main" id="{90405E51-22BB-FD8D-996C-7D2AA81EC6D6}"/>
-              </a:ext>
-            </a:extLst>
-          </p:cNvPr>
-          <p:cNvSpPr/>
-          <p:nvPr/>
-        </p:nvSpPr>
-        <p:spPr>
-          <a:xfrm>
-            <a:off x="9303935" y="2900892"/>
-            <a:ext cx="2414479" cy="750673"/>
-          </a:xfrm>
-          <a:prstGeom prst="roundRect">
-            <a:avLst/>
-          </a:prstGeom>
-          <a:ln w="38100"/>
-        </p:spPr>
-        <p:style>
-          <a:lnRef idx="2">
-            <a:schemeClr val="accent1"/>
-          </a:lnRef>
-          <a:fillRef idx="1">
-            <a:schemeClr val="lt1"/>
-          </a:fillRef>
-          <a:effectRef idx="0">
-            <a:schemeClr val="accent1"/>
-          </a:effectRef>
-          <a:fontRef idx="minor">
-            <a:schemeClr val="dk1"/>
-          </a:fontRef>
-        </p:style>
-        <p:txBody>
-          <a:bodyPr rtlCol="0" anchor="ctr"/>
-          <a:lstStyle/>
-          <a:p>
-            <a:pPr algn="ctr"/>
-            <a:r>
-              <a:rPr lang="zh-TW" altLang="en-US" sz="2800" b="1" dirty="0">
-                <a:latin typeface="標楷體" panose="03000509000000000000" pitchFamily="65" charset="-120"/>
-                <a:ea typeface="標楷體" panose="03000509000000000000" pitchFamily="65" charset="-120"/>
-              </a:rPr>
-              <a:t>取得姓名評分</a:t>
-            </a:r>
-          </a:p>
-        </p:txBody>
-      </p:sp>
-      <p:sp>
-        <p:nvSpPr>
-          <p:cNvPr id="17" name="箭號: 向右 16">
-            <a:extLst>
-              <a:ext uri="{FF2B5EF4-FFF2-40B4-BE49-F238E27FC236}">
-                <a16:creationId xmlns:a16="http://schemas.microsoft.com/office/drawing/2014/main" id="{F1CCC61A-528F-9EBD-C23C-2929E4BE6038}"/>
-              </a:ext>
-            </a:extLst>
-          </p:cNvPr>
-          <p:cNvSpPr/>
-          <p:nvPr/>
-        </p:nvSpPr>
-        <p:spPr>
-          <a:xfrm rot="10800000">
-            <a:off x="8235253" y="3350150"/>
-            <a:ext cx="757346" cy="297918"/>
-          </a:xfrm>
-          <a:prstGeom prst="rightArrow">
-            <a:avLst/>
-          </a:prstGeom>
-        </p:spPr>
-        <p:style>
-          <a:lnRef idx="2">
-            <a:schemeClr val="accent1">
-              <a:shade val="15000"/>
-            </a:schemeClr>
-          </a:lnRef>
-          <a:fillRef idx="1">
-            <a:schemeClr val="accent1"/>
-          </a:fillRef>
-          <a:effectRef idx="0">
-            <a:schemeClr val="accent1"/>
-          </a:effectRef>
-          <a:fontRef idx="minor">
-            <a:schemeClr val="lt1"/>
-          </a:fontRef>
-        </p:style>
-        <p:txBody>
-          <a:bodyPr rtlCol="0" anchor="ctr"/>
-          <a:lstStyle/>
-          <a:p>
-            <a:pPr algn="ctr"/>
-            <a:endParaRPr lang="zh-TW" altLang="en-US" dirty="0"/>
-          </a:p>
-        </p:txBody>
-      </p:sp>
-      <p:sp>
-        <p:nvSpPr>
-          <p:cNvPr id="21" name="箭號: 向右 20">
-            <a:extLst>
-              <a:ext uri="{FF2B5EF4-FFF2-40B4-BE49-F238E27FC236}">
-                <a16:creationId xmlns:a16="http://schemas.microsoft.com/office/drawing/2014/main" id="{7371A5FB-D94B-DC7D-1A98-6814B4EF2814}"/>
-              </a:ext>
-            </a:extLst>
-          </p:cNvPr>
-          <p:cNvSpPr/>
-          <p:nvPr/>
-        </p:nvSpPr>
-        <p:spPr>
-          <a:xfrm rot="5400000">
-            <a:off x="6108414" y="3898061"/>
-            <a:ext cx="335571" cy="477800"/>
-          </a:xfrm>
-          <a:prstGeom prst="rightArrow">
-            <a:avLst/>
-          </a:prstGeom>
-        </p:spPr>
-        <p:style>
-          <a:lnRef idx="2">
-            <a:schemeClr val="accent1">
-              <a:shade val="15000"/>
-            </a:schemeClr>
-          </a:lnRef>
-          <a:fillRef idx="1">
-            <a:schemeClr val="accent1"/>
-          </a:fillRef>
-          <a:effectRef idx="0">
-            <a:schemeClr val="accent1"/>
-          </a:effectRef>
-          <a:fontRef idx="minor">
-            <a:schemeClr val="lt1"/>
-          </a:fontRef>
-        </p:style>
-        <p:txBody>
-          <a:bodyPr rtlCol="0" anchor="ctr"/>
-          <a:lstStyle/>
-          <a:p>
-            <a:pPr algn="ctr"/>
-            <a:endParaRPr lang="zh-TW" altLang="en-US"/>
-          </a:p>
-        </p:txBody>
-      </p:sp>
-      <p:sp>
-        <p:nvSpPr>
-          <p:cNvPr id="22" name="矩形: 圓角 21">
-            <a:extLst>
-              <a:ext uri="{FF2B5EF4-FFF2-40B4-BE49-F238E27FC236}">
-                <a16:creationId xmlns:a16="http://schemas.microsoft.com/office/drawing/2014/main" id="{826805B7-FD79-A79E-7970-45686417A9B9}"/>
-              </a:ext>
-            </a:extLst>
-          </p:cNvPr>
-          <p:cNvSpPr/>
-          <p:nvPr/>
-        </p:nvSpPr>
-        <p:spPr>
-          <a:xfrm>
-            <a:off x="4539891" y="4494823"/>
-            <a:ext cx="3497778" cy="888007"/>
-          </a:xfrm>
-          <a:prstGeom prst="roundRect">
-            <a:avLst/>
-          </a:prstGeom>
-          <a:ln w="38100"/>
-        </p:spPr>
-        <p:style>
-          <a:lnRef idx="2">
-            <a:schemeClr val="accent1"/>
-          </a:lnRef>
-          <a:fillRef idx="1">
-            <a:schemeClr val="lt1"/>
-          </a:fillRef>
-          <a:effectRef idx="0">
-            <a:schemeClr val="accent1"/>
-          </a:effectRef>
-          <a:fontRef idx="minor">
-            <a:schemeClr val="dk1"/>
-          </a:fontRef>
-        </p:style>
-        <p:txBody>
-          <a:bodyPr rtlCol="0" anchor="ctr"/>
-          <a:lstStyle/>
-          <a:p>
-            <a:pPr algn="ctr"/>
-            <a:r>
-              <a:rPr lang="zh-TW" altLang="en-US" sz="2800" b="1" dirty="0">
-                <a:latin typeface="標楷體" panose="03000509000000000000" pitchFamily="65" charset="-120"/>
-                <a:ea typeface="標楷體" panose="03000509000000000000" pitchFamily="65" charset="-120"/>
-              </a:rPr>
-              <a:t>資料整理</a:t>
-            </a:r>
-          </a:p>
-        </p:txBody>
-      </p:sp>
-      <p:sp>
-        <p:nvSpPr>
-          <p:cNvPr id="23" name="文字方塊 22">
-            <a:extLst>
-              <a:ext uri="{FF2B5EF4-FFF2-40B4-BE49-F238E27FC236}">
-                <a16:creationId xmlns:a16="http://schemas.microsoft.com/office/drawing/2014/main" id="{5BB1164E-9A2C-E291-956F-CB0E5B4F6529}"/>
-              </a:ext>
-            </a:extLst>
-          </p:cNvPr>
-          <p:cNvSpPr txBox="1"/>
-          <p:nvPr/>
-        </p:nvSpPr>
-        <p:spPr>
-          <a:xfrm>
-            <a:off x="506376" y="191608"/>
-            <a:ext cx="5530924" cy="584775"/>
-          </a:xfrm>
-          <a:prstGeom prst="rect">
-            <a:avLst/>
-          </a:prstGeom>
-          <a:noFill/>
-        </p:spPr>
-        <p:txBody>
-          <a:bodyPr wrap="square" rtlCol="0">
-            <a:spAutoFit/>
-          </a:bodyPr>
-          <a:lstStyle/>
-          <a:p>
-            <a:r>
-              <a:rPr lang="zh-TW" altLang="en-US" sz="3200" b="1" dirty="0">
-                <a:latin typeface="標楷體" panose="03000509000000000000" pitchFamily="65" charset="-120"/>
-                <a:ea typeface="標楷體" panose="03000509000000000000" pitchFamily="65" charset="-120"/>
-              </a:rPr>
-              <a:t>架構說明</a:t>
-            </a:r>
-            <a:r>
-              <a:rPr lang="en-US" altLang="zh-TW" sz="3200" b="1" dirty="0">
-                <a:latin typeface="標楷體" panose="03000509000000000000" pitchFamily="65" charset="-120"/>
-                <a:ea typeface="標楷體" panose="03000509000000000000" pitchFamily="65" charset="-120"/>
-              </a:rPr>
-              <a:t>-</a:t>
-            </a:r>
-            <a:r>
-              <a:rPr lang="zh-TW" altLang="en-US" sz="3200" b="1" dirty="0">
-                <a:latin typeface="標楷體" panose="03000509000000000000" pitchFamily="65" charset="-120"/>
-                <a:ea typeface="標楷體" panose="03000509000000000000" pitchFamily="65" charset="-120"/>
-              </a:rPr>
-              <a:t>姓名分析</a:t>
-            </a:r>
-            <a:endParaRPr lang="zh-TW" altLang="en-US" sz="3200" b="1" dirty="0"/>
-          </a:p>
-        </p:txBody>
-      </p:sp>
-    </p:spTree>
-    <p:extLst>
-      <p:ext uri="{BB962C8B-B14F-4D97-AF65-F5344CB8AC3E}">
-        <p14:creationId xmlns:p14="http://schemas.microsoft.com/office/powerpoint/2010/main" val="3217501419"/>
-      </p:ext>
-    </p:extLst>
-  </p:cSld>
-  <p:clrMapOvr>
-    <a:masterClrMapping/>
-  </p:clrMapOvr>
-  <p:timing>
-    <p:tnLst>
-      <p:par>
-        <p:cTn id="1" dur="indefinite" restart="never" nodeType="tmRoot">
-          <p:childTnLst>
-            <p:seq concurrent="1" nextAc="seek">
-              <p:cTn id="2" dur="indefinite" nodeType="mainSeq">
-                <p:childTnLst>
-                  <p:par>
-                    <p:cTn id="3" fill="hold">
-                      <p:stCondLst>
-                        <p:cond delay="indefinite"/>
-                      </p:stCondLst>
-                      <p:childTnLst>
-                        <p:par>
-                          <p:cTn id="4" fill="hold">
-                            <p:stCondLst>
-                              <p:cond delay="0"/>
-                            </p:stCondLst>
-                            <p:childTnLst>
-                              <p:par>
-                                <p:cTn id="5" presetID="1" presetClass="entr" presetSubtype="0" fill="hold" grpId="0" nodeType="clickEffect">
-                                  <p:stCondLst>
-                                    <p:cond delay="0"/>
-                                  </p:stCondLst>
-                                  <p:childTnLst>
-                                    <p:set>
-                                      <p:cBhvr>
-                                        <p:cTn id="6" dur="1" fill="hold">
-                                          <p:stCondLst>
-                                            <p:cond delay="0"/>
-                                          </p:stCondLst>
-                                        </p:cTn>
-                                        <p:tgtEl>
-                                          <p:spTgt spid="7"/>
-                                        </p:tgtEl>
-                                        <p:attrNameLst>
-                                          <p:attrName>style.visibility</p:attrName>
-                                        </p:attrNameLst>
-                                      </p:cBhvr>
-                                      <p:to>
-                                        <p:strVal val="visible"/>
-                                      </p:to>
-                                    </p:set>
-                                  </p:childTnLst>
-                                </p:cTn>
-                              </p:par>
-                              <p:par>
-                                <p:cTn id="7" presetID="1" presetClass="entr" presetSubtype="0" fill="hold" grpId="0" nodeType="withEffect">
-                                  <p:stCondLst>
-                                    <p:cond delay="0"/>
-                                  </p:stCondLst>
-                                  <p:childTnLst>
-                                    <p:set>
-                                      <p:cBhvr>
-                                        <p:cTn id="8" dur="1" fill="hold">
-                                          <p:stCondLst>
-                                            <p:cond delay="0"/>
-                                          </p:stCondLst>
-                                        </p:cTn>
-                                        <p:tgtEl>
-                                          <p:spTgt spid="8"/>
-                                        </p:tgtEl>
-                                        <p:attrNameLst>
-                                          <p:attrName>style.visibility</p:attrName>
-                                        </p:attrNameLst>
-                                      </p:cBhvr>
-                                      <p:to>
-                                        <p:strVal val="visible"/>
-                                      </p:to>
-                                    </p:set>
-                                  </p:childTnLst>
-                                </p:cTn>
-                              </p:par>
-                            </p:childTnLst>
-                          </p:cTn>
-                        </p:par>
-                      </p:childTnLst>
-                    </p:cTn>
-                  </p:par>
-                  <p:par>
-                    <p:cTn id="9" fill="hold">
-                      <p:stCondLst>
-                        <p:cond delay="indefinite"/>
-                      </p:stCondLst>
-                      <p:childTnLst>
-                        <p:par>
-                          <p:cTn id="10" fill="hold">
-                            <p:stCondLst>
-                              <p:cond delay="0"/>
-                            </p:stCondLst>
-                            <p:childTnLst>
-                              <p:par>
-                                <p:cTn id="11" presetID="1" presetClass="entr" presetSubtype="0" fill="hold" grpId="0" nodeType="clickEffect">
-                                  <p:stCondLst>
-                                    <p:cond delay="0"/>
-                                  </p:stCondLst>
-                                  <p:childTnLst>
-                                    <p:set>
-                                      <p:cBhvr>
-                                        <p:cTn id="12" dur="1" fill="hold">
-                                          <p:stCondLst>
-                                            <p:cond delay="0"/>
-                                          </p:stCondLst>
-                                        </p:cTn>
-                                        <p:tgtEl>
-                                          <p:spTgt spid="9"/>
-                                        </p:tgtEl>
-                                        <p:attrNameLst>
-                                          <p:attrName>style.visibility</p:attrName>
-                                        </p:attrNameLst>
-                                      </p:cBhvr>
-                                      <p:to>
-                                        <p:strVal val="visible"/>
-                                      </p:to>
-                                    </p:set>
-                                  </p:childTnLst>
-                                </p:cTn>
-                              </p:par>
-                              <p:par>
-                                <p:cTn id="13" presetID="1" presetClass="entr" presetSubtype="0" fill="hold" grpId="0" nodeType="withEffect">
-                                  <p:stCondLst>
-                                    <p:cond delay="0"/>
-                                  </p:stCondLst>
-                                  <p:childTnLst>
-                                    <p:set>
-                                      <p:cBhvr>
-                                        <p:cTn id="14" dur="1" fill="hold">
-                                          <p:stCondLst>
-                                            <p:cond delay="0"/>
-                                          </p:stCondLst>
-                                        </p:cTn>
-                                        <p:tgtEl>
-                                          <p:spTgt spid="11"/>
-                                        </p:tgtEl>
-                                        <p:attrNameLst>
-                                          <p:attrName>style.visibility</p:attrName>
-                                        </p:attrNameLst>
-                                      </p:cBhvr>
-                                      <p:to>
-                                        <p:strVal val="visible"/>
-                                      </p:to>
-                                    </p:set>
-                                  </p:childTnLst>
-                                </p:cTn>
-                              </p:par>
-                              <p:par>
-                                <p:cTn id="15" presetID="1" presetClass="entr" presetSubtype="0" fill="hold" grpId="0" nodeType="withEffect">
-                                  <p:stCondLst>
-                                    <p:cond delay="0"/>
-                                  </p:stCondLst>
-                                  <p:childTnLst>
-                                    <p:set>
-                                      <p:cBhvr>
-                                        <p:cTn id="16" dur="1" fill="hold">
-                                          <p:stCondLst>
-                                            <p:cond delay="0"/>
-                                          </p:stCondLst>
-                                        </p:cTn>
-                                        <p:tgtEl>
-                                          <p:spTgt spid="12"/>
-                                        </p:tgtEl>
-                                        <p:attrNameLst>
-                                          <p:attrName>style.visibility</p:attrName>
-                                        </p:attrNameLst>
-                                      </p:cBhvr>
-                                      <p:to>
-                                        <p:strVal val="visible"/>
-                                      </p:to>
-                                    </p:set>
-                                  </p:childTnLst>
-                                </p:cTn>
-                              </p:par>
-                            </p:childTnLst>
-                          </p:cTn>
-                        </p:par>
-                      </p:childTnLst>
-                    </p:cTn>
-                  </p:par>
-                  <p:par>
-                    <p:cTn id="17" fill="hold">
-                      <p:stCondLst>
-                        <p:cond delay="indefinite"/>
-                      </p:stCondLst>
-                      <p:childTnLst>
-                        <p:par>
-                          <p:cTn id="18" fill="hold">
-                            <p:stCondLst>
-                              <p:cond delay="0"/>
-                            </p:stCondLst>
-                            <p:childTnLst>
-                              <p:par>
-                                <p:cTn id="19" presetID="1" presetClass="entr" presetSubtype="0" fill="hold" grpId="0" nodeType="clickEffect">
-                                  <p:stCondLst>
-                                    <p:cond delay="0"/>
-                                  </p:stCondLst>
-                                  <p:childTnLst>
-                                    <p:set>
-                                      <p:cBhvr>
-                                        <p:cTn id="20" dur="1" fill="hold">
-                                          <p:stCondLst>
-                                            <p:cond delay="0"/>
-                                          </p:stCondLst>
-                                        </p:cTn>
-                                        <p:tgtEl>
-                                          <p:spTgt spid="13"/>
-                                        </p:tgtEl>
-                                        <p:attrNameLst>
-                                          <p:attrName>style.visibility</p:attrName>
-                                        </p:attrNameLst>
-                                      </p:cBhvr>
-                                      <p:to>
-                                        <p:strVal val="visible"/>
-                                      </p:to>
-                                    </p:set>
-                                  </p:childTnLst>
-                                </p:cTn>
-                              </p:par>
-                              <p:par>
-                                <p:cTn id="21" presetID="1" presetClass="entr" presetSubtype="0" fill="hold" grpId="0" nodeType="withEffect">
-                                  <p:stCondLst>
-                                    <p:cond delay="0"/>
-                                  </p:stCondLst>
-                                  <p:childTnLst>
-                                    <p:set>
-                                      <p:cBhvr>
-                                        <p:cTn id="22" dur="1" fill="hold">
-                                          <p:stCondLst>
-                                            <p:cond delay="0"/>
-                                          </p:stCondLst>
-                                        </p:cTn>
-                                        <p:tgtEl>
-                                          <p:spTgt spid="15"/>
-                                        </p:tgtEl>
-                                        <p:attrNameLst>
-                                          <p:attrName>style.visibility</p:attrName>
-                                        </p:attrNameLst>
-                                      </p:cBhvr>
-                                      <p:to>
-                                        <p:strVal val="visible"/>
-                                      </p:to>
-                                    </p:set>
-                                  </p:childTnLst>
-                                </p:cTn>
-                              </p:par>
-                            </p:childTnLst>
-                          </p:cTn>
-                        </p:par>
-                      </p:childTnLst>
-                    </p:cTn>
-                  </p:par>
-                  <p:par>
-                    <p:cTn id="23" fill="hold">
-                      <p:stCondLst>
-                        <p:cond delay="indefinite"/>
-                      </p:stCondLst>
-                      <p:childTnLst>
-                        <p:par>
-                          <p:cTn id="24" fill="hold">
-                            <p:stCondLst>
-                              <p:cond delay="0"/>
-                            </p:stCondLst>
-                            <p:childTnLst>
-                              <p:par>
-                                <p:cTn id="25" presetID="1" presetClass="entr" presetSubtype="0" fill="hold" grpId="0" nodeType="clickEffect">
-                                  <p:stCondLst>
-                                    <p:cond delay="0"/>
-                                  </p:stCondLst>
-                                  <p:childTnLst>
-                                    <p:set>
-                                      <p:cBhvr>
-                                        <p:cTn id="26" dur="1" fill="hold">
-                                          <p:stCondLst>
-                                            <p:cond delay="0"/>
-                                          </p:stCondLst>
-                                        </p:cTn>
-                                        <p:tgtEl>
-                                          <p:spTgt spid="10"/>
-                                        </p:tgtEl>
-                                        <p:attrNameLst>
-                                          <p:attrName>style.visibility</p:attrName>
-                                        </p:attrNameLst>
-                                      </p:cBhvr>
-                                      <p:to>
-                                        <p:strVal val="visible"/>
-                                      </p:to>
-                                    </p:set>
-                                  </p:childTnLst>
-                                </p:cTn>
-                              </p:par>
-                              <p:par>
-                                <p:cTn id="27" presetID="1" presetClass="entr" presetSubtype="0" fill="hold" grpId="0" nodeType="withEffect">
-                                  <p:stCondLst>
-                                    <p:cond delay="0"/>
-                                  </p:stCondLst>
-                                  <p:childTnLst>
-                                    <p:set>
-                                      <p:cBhvr>
-                                        <p:cTn id="28" dur="1" fill="hold">
-                                          <p:stCondLst>
-                                            <p:cond delay="0"/>
-                                          </p:stCondLst>
-                                        </p:cTn>
-                                        <p:tgtEl>
-                                          <p:spTgt spid="14"/>
-                                        </p:tgtEl>
-                                        <p:attrNameLst>
-                                          <p:attrName>style.visibility</p:attrName>
-                                        </p:attrNameLst>
-                                      </p:cBhvr>
-                                      <p:to>
-                                        <p:strVal val="visible"/>
-                                      </p:to>
-                                    </p:set>
-                                  </p:childTnLst>
-                                </p:cTn>
-                              </p:par>
-                              <p:par>
-                                <p:cTn id="29" presetID="1" presetClass="entr" presetSubtype="0" fill="hold" grpId="0" nodeType="withEffect">
-                                  <p:stCondLst>
-                                    <p:cond delay="0"/>
-                                  </p:stCondLst>
-                                  <p:childTnLst>
-                                    <p:set>
-                                      <p:cBhvr>
-                                        <p:cTn id="30" dur="1" fill="hold">
-                                          <p:stCondLst>
-                                            <p:cond delay="0"/>
-                                          </p:stCondLst>
-                                        </p:cTn>
-                                        <p:tgtEl>
-                                          <p:spTgt spid="17"/>
-                                        </p:tgtEl>
-                                        <p:attrNameLst>
-                                          <p:attrName>style.visibility</p:attrName>
-                                        </p:attrNameLst>
-                                      </p:cBhvr>
-                                      <p:to>
-                                        <p:strVal val="visible"/>
-                                      </p:to>
-                                    </p:set>
-                                  </p:childTnLst>
-                                </p:cTn>
-                              </p:par>
-                            </p:childTnLst>
-                          </p:cTn>
-                        </p:par>
-                      </p:childTnLst>
-                    </p:cTn>
-                  </p:par>
-                  <p:par>
-                    <p:cTn id="31" fill="hold">
-                      <p:stCondLst>
-                        <p:cond delay="indefinite"/>
-                      </p:stCondLst>
-                      <p:childTnLst>
-                        <p:par>
-                          <p:cTn id="32" fill="hold">
-                            <p:stCondLst>
-                              <p:cond delay="0"/>
-                            </p:stCondLst>
-                            <p:childTnLst>
-                              <p:par>
-                                <p:cTn id="33" presetID="1" presetClass="entr" presetSubtype="0" fill="hold" grpId="0" nodeType="clickEffect">
-                                  <p:stCondLst>
-                                    <p:cond delay="0"/>
-                                  </p:stCondLst>
-                                  <p:childTnLst>
-                                    <p:set>
-                                      <p:cBhvr>
-                                        <p:cTn id="34" dur="1" fill="hold">
-                                          <p:stCondLst>
-                                            <p:cond delay="0"/>
-                                          </p:stCondLst>
-                                        </p:cTn>
-                                        <p:tgtEl>
-                                          <p:spTgt spid="21"/>
-                                        </p:tgtEl>
-                                        <p:attrNameLst>
-                                          <p:attrName>style.visibility</p:attrName>
-                                        </p:attrNameLst>
-                                      </p:cBhvr>
-                                      <p:to>
-                                        <p:strVal val="visible"/>
-                                      </p:to>
-                                    </p:set>
-                                  </p:childTnLst>
-                                </p:cTn>
-                              </p:par>
-                              <p:par>
-                                <p:cTn id="35" presetID="1" presetClass="entr" presetSubtype="0" fill="hold" grpId="0" nodeType="withEffect">
-                                  <p:stCondLst>
-                                    <p:cond delay="0"/>
-                                  </p:stCondLst>
-                                  <p:childTnLst>
-                                    <p:set>
-                                      <p:cBhvr>
-                                        <p:cTn id="36" dur="1" fill="hold">
-                                          <p:stCondLst>
-                                            <p:cond delay="0"/>
-                                          </p:stCondLst>
-                                        </p:cTn>
-                                        <p:tgtEl>
-                                          <p:spTgt spid="22"/>
-                                        </p:tgtEl>
-                                        <p:attrNameLst>
-                                          <p:attrName>style.visibility</p:attrName>
-                                        </p:attrNameLst>
-                                      </p:cBhvr>
-                                      <p:to>
-                                        <p:strVal val="visible"/>
-                                      </p:to>
-                                    </p:set>
-                                  </p:childTnLst>
-                                </p:cTn>
-                              </p:par>
-                            </p:childTnLst>
-                          </p:cTn>
-                        </p:par>
-                      </p:childTnLst>
-                    </p:cTn>
-                  </p:par>
-                  <p:par>
-                    <p:cTn id="37" fill="hold">
-                      <p:stCondLst>
-                        <p:cond delay="indefinite"/>
-                      </p:stCondLst>
-                      <p:childTnLst>
-                        <p:par>
-                          <p:cTn id="38" fill="hold">
-                            <p:stCondLst>
-                              <p:cond delay="0"/>
-                            </p:stCondLst>
-                            <p:childTnLst>
-                              <p:par>
-                                <p:cTn id="39" presetID="1" presetClass="entr" presetSubtype="0" fill="hold" grpId="0" nodeType="clickEffect">
-                                  <p:stCondLst>
-                                    <p:cond delay="0"/>
-                                  </p:stCondLst>
-                                  <p:childTnLst>
-                                    <p:set>
-                                      <p:cBhvr>
-                                        <p:cTn id="40" dur="1" fill="hold">
-                                          <p:stCondLst>
-                                            <p:cond delay="0"/>
-                                          </p:stCondLst>
-                                        </p:cTn>
-                                        <p:tgtEl>
-                                          <p:spTgt spid="16"/>
-                                        </p:tgtEl>
-                                        <p:attrNameLst>
-                                          <p:attrName>style.visibility</p:attrName>
-                                        </p:attrNameLst>
-                                      </p:cBhvr>
-                                      <p:to>
-                                        <p:strVal val="visible"/>
-                                      </p:to>
-                                    </p:set>
-                                  </p:childTnLst>
-                                </p:cTn>
-                              </p:par>
-                              <p:par>
-                                <p:cTn id="41" presetID="1" presetClass="entr" presetSubtype="0" fill="hold" grpId="0" nodeType="withEffect">
-                                  <p:stCondLst>
-                                    <p:cond delay="0"/>
-                                  </p:stCondLst>
-                                  <p:childTnLst>
-                                    <p:set>
-                                      <p:cBhvr>
-                                        <p:cTn id="42" dur="1" fill="hold">
-                                          <p:stCondLst>
-                                            <p:cond delay="0"/>
-                                          </p:stCondLst>
-                                        </p:cTn>
-                                        <p:tgtEl>
-                                          <p:spTgt spid="18"/>
-                                        </p:tgtEl>
-                                        <p:attrNameLst>
-                                          <p:attrName>style.visibility</p:attrName>
-                                        </p:attrNameLst>
-                                      </p:cBhvr>
-                                      <p:to>
-                                        <p:strVal val="visible"/>
-                                      </p:to>
-                                    </p:set>
-                                  </p:childTnLst>
-                                </p:cTn>
-                              </p:par>
-                            </p:childTnLst>
-                          </p:cTn>
-                        </p:par>
-                      </p:childTnLst>
-                    </p:cTn>
-                  </p:par>
-                </p:childTnLst>
-              </p:cTn>
-              <p:prevCondLst>
-                <p:cond evt="onPrev" delay="0">
-                  <p:tgtEl>
-                    <p:sldTgt/>
-                  </p:tgtEl>
-                </p:cond>
-              </p:prevCondLst>
-              <p:nextCondLst>
-                <p:cond evt="onNext" delay="0">
-                  <p:tgtEl>
-                    <p:sldTgt/>
-                  </p:tgtEl>
-                </p:cond>
-              </p:nextCondLst>
-            </p:seq>
-          </p:childTnLst>
-        </p:cTn>
-      </p:par>
-    </p:tnLst>
-    <p:bldLst>
-      <p:bldP spid="7" grpId="0" animBg="1"/>
-      <p:bldP spid="8" grpId="0" animBg="1"/>
-      <p:bldP spid="9" grpId="0" animBg="1"/>
-      <p:bldP spid="11" grpId="0" animBg="1"/>
-      <p:bldP spid="12" grpId="0" animBg="1"/>
-      <p:bldP spid="13" grpId="0" animBg="1"/>
-      <p:bldP spid="15" grpId="0" animBg="1"/>
-      <p:bldP spid="16" grpId="0" animBg="1"/>
-      <p:bldP spid="18" grpId="0" animBg="1"/>
-      <p:bldP spid="10" grpId="0" animBg="1"/>
-      <p:bldP spid="14" grpId="0" animBg="1"/>
-      <p:bldP spid="17" grpId="0" animBg="1"/>
-      <p:bldP spid="21" grpId="0" animBg="1"/>
-      <p:bldP spid="22" grpId="0" animBg="1"/>
-    </p:bldLst>
-  </p:timing>
-</p:sld>
-</file>
-
 <file path=ppt/slides/slide8.xml><?xml version="1.0" encoding="utf-8"?>
 <p:sld xmlns:a="http://schemas.openxmlformats.org/drawingml/2006/main" xmlns:r="http://schemas.openxmlformats.org/officeDocument/2006/relationships" xmlns:p="http://schemas.openxmlformats.org/presentationml/2006/main">
   <p:cSld>
@@ -9254,7 +9351,7 @@
                 <a:latin typeface="標楷體" panose="03000509000000000000" pitchFamily="65" charset="-120"/>
                 <a:ea typeface="標楷體" panose="03000509000000000000" pitchFamily="65" charset="-120"/>
               </a:rPr>
-              <a:t>使用工具及參考資料</a:t>
+              <a:t>製作歷程</a:t>
             </a:r>
             <a:endParaRPr lang="en-US" altLang="zh-TW" sz="3200" dirty="0">
               <a:latin typeface="標楷體" panose="03000509000000000000" pitchFamily="65" charset="-120"/>
@@ -9263,397 +9360,41 @@
           </a:p>
         </p:txBody>
       </p:sp>
-      <p:sp>
-        <p:nvSpPr>
-          <p:cNvPr id="5" name="文字方塊 4">
+      <p:pic>
+        <p:nvPicPr>
+          <p:cNvPr id="3" name="圖片 2">
             <a:extLst>
               <a:ext uri="{FF2B5EF4-FFF2-40B4-BE49-F238E27FC236}">
-                <a16:creationId xmlns:a16="http://schemas.microsoft.com/office/drawing/2014/main" id="{0272076D-5EC8-EC40-5E82-A042B288E3DC}"/>
+                <a16:creationId xmlns:a16="http://schemas.microsoft.com/office/drawing/2014/main" id="{32E88373-CA36-4F02-2CD0-E42146C00FED}"/>
               </a:ext>
             </a:extLst>
           </p:cNvPr>
-          <p:cNvSpPr txBox="1"/>
+          <p:cNvPicPr>
+            <a:picLocks noChangeAspect="1"/>
+          </p:cNvPicPr>
           <p:nvPr/>
-        </p:nvSpPr>
+        </p:nvPicPr>
+        <p:blipFill>
+          <a:blip r:embed="rId2">
+            <a:extLst>
+              <a:ext uri="{28A0092B-C50C-407E-A947-70E740481C1C}">
+                <a14:useLocalDpi xmlns:a14="http://schemas.microsoft.com/office/drawing/2010/main" val="0"/>
+              </a:ext>
+            </a:extLst>
+          </a:blip>
+          <a:srcRect/>
+          <a:stretch/>
+        </p:blipFill>
         <p:spPr>
           <a:xfrm>
-            <a:off x="257176" y="974788"/>
-            <a:ext cx="11934824" cy="5693866"/>
+            <a:off x="391567" y="1613118"/>
+            <a:ext cx="11495634" cy="4244757"/>
           </a:xfrm>
           <a:prstGeom prst="rect">
             <a:avLst/>
           </a:prstGeom>
-          <a:noFill/>
         </p:spPr>
-        <p:txBody>
-          <a:bodyPr wrap="square" rtlCol="0">
-            <a:spAutoFit/>
-          </a:bodyPr>
-          <a:lstStyle/>
-          <a:p>
-            <a:r>
-              <a:rPr lang="en-US" altLang="zh-TW" sz="2800" b="0" i="0" dirty="0">
-                <a:effectLst/>
-                <a:latin typeface="Times New Roman" panose="02020603050405020304" pitchFamily="18" charset="0"/>
-                <a:ea typeface="標楷體" panose="03000509000000000000" pitchFamily="65" charset="-120"/>
-                <a:cs typeface="Times New Roman" panose="02020603050405020304" pitchFamily="18" charset="0"/>
-              </a:rPr>
-              <a:t>HTML, CSS, Bootstrap, </a:t>
-            </a:r>
-            <a:r>
-              <a:rPr lang="en-US" altLang="zh-TW" sz="2800" b="0" i="0" dirty="0" err="1">
-                <a:effectLst/>
-                <a:latin typeface="Times New Roman" panose="02020603050405020304" pitchFamily="18" charset="0"/>
-                <a:ea typeface="標楷體" panose="03000509000000000000" pitchFamily="65" charset="-120"/>
-                <a:cs typeface="Times New Roman" panose="02020603050405020304" pitchFamily="18" charset="0"/>
-              </a:rPr>
-              <a:t>Jquery</a:t>
-            </a:r>
-            <a:r>
-              <a:rPr lang="en-US" altLang="zh-TW" sz="2800" b="0" i="0" dirty="0">
-                <a:effectLst/>
-                <a:latin typeface="Times New Roman" panose="02020603050405020304" pitchFamily="18" charset="0"/>
-                <a:ea typeface="標楷體" panose="03000509000000000000" pitchFamily="65" charset="-120"/>
-                <a:cs typeface="Times New Roman" panose="02020603050405020304" pitchFamily="18" charset="0"/>
-              </a:rPr>
-              <a:t>, </a:t>
-            </a:r>
-            <a:r>
-              <a:rPr lang="en-US" altLang="zh-TW" sz="2800" dirty="0">
-                <a:latin typeface="Times New Roman" panose="02020603050405020304" pitchFamily="18" charset="0"/>
-                <a:ea typeface="標楷體" panose="03000509000000000000" pitchFamily="65" charset="-120"/>
-                <a:cs typeface="Times New Roman" panose="02020603050405020304" pitchFamily="18" charset="0"/>
-              </a:rPr>
-              <a:t>MYSQL</a:t>
-            </a:r>
-            <a:endParaRPr lang="en-US" altLang="zh-TW" sz="2800" b="0" i="0" dirty="0">
-              <a:effectLst/>
-              <a:latin typeface="Times New Roman" panose="02020603050405020304" pitchFamily="18" charset="0"/>
-              <a:ea typeface="標楷體" panose="03000509000000000000" pitchFamily="65" charset="-120"/>
-              <a:cs typeface="Times New Roman" panose="02020603050405020304" pitchFamily="18" charset="0"/>
-            </a:endParaRPr>
-          </a:p>
-          <a:p>
-            <a:r>
-              <a:rPr lang="en-US" altLang="zh-TW" sz="2800" b="0" i="0" dirty="0">
-                <a:effectLst/>
-                <a:latin typeface="Times New Roman" panose="02020603050405020304" pitchFamily="18" charset="0"/>
-                <a:ea typeface="標楷體" panose="03000509000000000000" pitchFamily="65" charset="-120"/>
-                <a:cs typeface="Times New Roman" panose="02020603050405020304" pitchFamily="18" charset="0"/>
-              </a:rPr>
-              <a:t>Node.js- express, </a:t>
-            </a:r>
-            <a:r>
-              <a:rPr lang="en-US" altLang="zh-TW" sz="2800" b="0" i="0" dirty="0" err="1">
-                <a:effectLst/>
-                <a:latin typeface="Times New Roman" panose="02020603050405020304" pitchFamily="18" charset="0"/>
-                <a:ea typeface="標楷體" panose="03000509000000000000" pitchFamily="65" charset="-120"/>
-                <a:cs typeface="Times New Roman" panose="02020603050405020304" pitchFamily="18" charset="0"/>
-              </a:rPr>
-              <a:t>mysql</a:t>
-            </a:r>
-            <a:r>
-              <a:rPr lang="en-US" altLang="zh-TW" sz="2800" b="0" i="0" dirty="0">
-                <a:effectLst/>
-                <a:latin typeface="Times New Roman" panose="02020603050405020304" pitchFamily="18" charset="0"/>
-                <a:ea typeface="標楷體" panose="03000509000000000000" pitchFamily="65" charset="-120"/>
-                <a:cs typeface="Times New Roman" panose="02020603050405020304" pitchFamily="18" charset="0"/>
-              </a:rPr>
-              <a:t>, puppeteer, toast</a:t>
-            </a:r>
-            <a:r>
-              <a:rPr lang="zh-TW" altLang="en-US" sz="2800" b="0" i="0" dirty="0">
-                <a:effectLst/>
-                <a:latin typeface="Times New Roman" panose="02020603050405020304" pitchFamily="18" charset="0"/>
-                <a:ea typeface="標楷體" panose="03000509000000000000" pitchFamily="65" charset="-120"/>
-                <a:cs typeface="Times New Roman" panose="02020603050405020304" pitchFamily="18" charset="0"/>
-              </a:rPr>
-              <a:t> </a:t>
-            </a:r>
-            <a:r>
-              <a:rPr lang="en-US" altLang="zh-TW" sz="2800" b="0" i="0" dirty="0">
-                <a:effectLst/>
-                <a:latin typeface="Times New Roman" panose="02020603050405020304" pitchFamily="18" charset="0"/>
-                <a:ea typeface="標楷體" panose="03000509000000000000" pitchFamily="65" charset="-120"/>
-                <a:cs typeface="Times New Roman" panose="02020603050405020304" pitchFamily="18" charset="0"/>
-              </a:rPr>
-              <a:t>(</a:t>
-            </a:r>
-            <a:r>
-              <a:rPr lang="zh-TW" altLang="en-US" sz="2800" b="0" i="0" dirty="0">
-                <a:effectLst/>
-                <a:latin typeface="Times New Roman" panose="02020603050405020304" pitchFamily="18" charset="0"/>
-                <a:ea typeface="標楷體" panose="03000509000000000000" pitchFamily="65" charset="-120"/>
-                <a:cs typeface="Times New Roman" panose="02020603050405020304" pitchFamily="18" charset="0"/>
-              </a:rPr>
-              <a:t>錢老師上課資料為基底修改</a:t>
-            </a:r>
-            <a:r>
-              <a:rPr lang="en-US" altLang="zh-TW" sz="2800" b="0" i="0" dirty="0">
-                <a:effectLst/>
-                <a:latin typeface="Times New Roman" panose="02020603050405020304" pitchFamily="18" charset="0"/>
-                <a:ea typeface="標楷體" panose="03000509000000000000" pitchFamily="65" charset="-120"/>
-                <a:cs typeface="Times New Roman" panose="02020603050405020304" pitchFamily="18" charset="0"/>
-              </a:rPr>
-              <a:t>)</a:t>
-            </a:r>
-          </a:p>
-          <a:p>
-            <a:r>
-              <a:rPr lang="en-US" altLang="zh-TW" sz="2800" b="0" i="0" dirty="0">
-                <a:solidFill>
-                  <a:srgbClr val="7030A0"/>
-                </a:solidFill>
-                <a:effectLst/>
-                <a:latin typeface="Times New Roman" panose="02020603050405020304" pitchFamily="18" charset="0"/>
-                <a:ea typeface="標楷體" panose="03000509000000000000" pitchFamily="65" charset="-120"/>
-                <a:cs typeface="Times New Roman" panose="02020603050405020304" pitchFamily="18" charset="0"/>
-              </a:rPr>
-              <a:t>-----------</a:t>
-            </a:r>
-            <a:r>
-              <a:rPr lang="zh-TW" altLang="en-US" sz="2800" b="0" i="0" dirty="0">
-                <a:solidFill>
-                  <a:srgbClr val="7030A0"/>
-                </a:solidFill>
-                <a:effectLst/>
-                <a:latin typeface="Times New Roman" panose="02020603050405020304" pitchFamily="18" charset="0"/>
-                <a:ea typeface="標楷體" panose="03000509000000000000" pitchFamily="65" charset="-120"/>
-                <a:cs typeface="Times New Roman" panose="02020603050405020304" pitchFamily="18" charset="0"/>
-              </a:rPr>
-              <a:t>自製工具</a:t>
-            </a:r>
-            <a:r>
-              <a:rPr lang="en-US" altLang="zh-TW" sz="2800" b="0" i="0" dirty="0">
-                <a:solidFill>
-                  <a:srgbClr val="7030A0"/>
-                </a:solidFill>
-                <a:effectLst/>
-                <a:latin typeface="Times New Roman" panose="02020603050405020304" pitchFamily="18" charset="0"/>
-                <a:ea typeface="標楷體" panose="03000509000000000000" pitchFamily="65" charset="-120"/>
-                <a:cs typeface="Times New Roman" panose="02020603050405020304" pitchFamily="18" charset="0"/>
-              </a:rPr>
-              <a:t>--------------------</a:t>
-            </a:r>
-          </a:p>
-          <a:p>
-            <a:r>
-              <a:rPr lang="en-US" altLang="zh-TW" sz="2800" b="1" dirty="0">
-                <a:latin typeface="Times New Roman" panose="02020603050405020304" pitchFamily="18" charset="0"/>
-                <a:ea typeface="標楷體" panose="03000509000000000000" pitchFamily="65" charset="-120"/>
-                <a:cs typeface="Times New Roman" panose="02020603050405020304" pitchFamily="18" charset="0"/>
-              </a:rPr>
-              <a:t>Json</a:t>
-            </a:r>
-            <a:r>
-              <a:rPr lang="zh-TW" altLang="en-US" sz="2800" b="1" dirty="0">
-                <a:latin typeface="Times New Roman" panose="02020603050405020304" pitchFamily="18" charset="0"/>
-                <a:ea typeface="標楷體" panose="03000509000000000000" pitchFamily="65" charset="-120"/>
-                <a:cs typeface="Times New Roman" panose="02020603050405020304" pitchFamily="18" charset="0"/>
-              </a:rPr>
-              <a:t>檔案自動寫入資料庫、資料庫資料檢查、比對網路資料自動修正資料庫</a:t>
-            </a:r>
-            <a:endParaRPr lang="en-US" altLang="zh-TW" sz="2800" b="1" i="0" dirty="0">
-              <a:effectLst/>
-              <a:latin typeface="Times New Roman" panose="02020603050405020304" pitchFamily="18" charset="0"/>
-              <a:ea typeface="標楷體" panose="03000509000000000000" pitchFamily="65" charset="-120"/>
-              <a:cs typeface="Times New Roman" panose="02020603050405020304" pitchFamily="18" charset="0"/>
-            </a:endParaRPr>
-          </a:p>
-          <a:p>
-            <a:r>
-              <a:rPr lang="en-US" altLang="zh-TW" sz="2800" b="0" i="0" dirty="0">
-                <a:solidFill>
-                  <a:srgbClr val="7030A0"/>
-                </a:solidFill>
-                <a:effectLst/>
-                <a:latin typeface="Times New Roman" panose="02020603050405020304" pitchFamily="18" charset="0"/>
-                <a:ea typeface="標楷體" panose="03000509000000000000" pitchFamily="65" charset="-120"/>
-                <a:cs typeface="Times New Roman" panose="02020603050405020304" pitchFamily="18" charset="0"/>
-              </a:rPr>
-              <a:t>-----------</a:t>
-            </a:r>
-            <a:r>
-              <a:rPr lang="zh-TW" altLang="en-US" sz="2800" b="0" i="0" dirty="0">
-                <a:solidFill>
-                  <a:srgbClr val="7030A0"/>
-                </a:solidFill>
-                <a:effectLst/>
-                <a:latin typeface="Times New Roman" panose="02020603050405020304" pitchFamily="18" charset="0"/>
-                <a:ea typeface="標楷體" panose="03000509000000000000" pitchFamily="65" charset="-120"/>
-                <a:cs typeface="Times New Roman" panose="02020603050405020304" pitchFamily="18" charset="0"/>
-              </a:rPr>
-              <a:t>參考資料</a:t>
-            </a:r>
-            <a:r>
-              <a:rPr lang="en-US" altLang="zh-TW" sz="2800" b="0" i="0" dirty="0">
-                <a:solidFill>
-                  <a:srgbClr val="7030A0"/>
-                </a:solidFill>
-                <a:effectLst/>
-                <a:latin typeface="Times New Roman" panose="02020603050405020304" pitchFamily="18" charset="0"/>
-                <a:ea typeface="標楷體" panose="03000509000000000000" pitchFamily="65" charset="-120"/>
-                <a:cs typeface="Times New Roman" panose="02020603050405020304" pitchFamily="18" charset="0"/>
-              </a:rPr>
-              <a:t>--------------------</a:t>
-            </a:r>
-          </a:p>
-          <a:p>
-            <a:r>
-              <a:rPr lang="en-US" altLang="zh-TW" sz="2800" b="1" i="0" dirty="0">
-                <a:effectLst/>
-                <a:latin typeface="Times New Roman" panose="02020603050405020304" pitchFamily="18" charset="0"/>
-                <a:ea typeface="標楷體" panose="03000509000000000000" pitchFamily="65" charset="-120"/>
-                <a:cs typeface="Times New Roman" panose="02020603050405020304" pitchFamily="18" charset="0"/>
-              </a:rPr>
-              <a:t>John Wu’s Blog-</a:t>
-            </a:r>
-            <a:r>
-              <a:rPr lang="zh-TW" altLang="en-US" sz="2800" b="1" i="0" dirty="0">
-                <a:effectLst/>
-                <a:latin typeface="Times New Roman" panose="02020603050405020304" pitchFamily="18" charset="0"/>
-                <a:ea typeface="標楷體" panose="03000509000000000000" pitchFamily="65" charset="-120"/>
-                <a:cs typeface="Times New Roman" panose="02020603050405020304" pitchFamily="18" charset="0"/>
-              </a:rPr>
-              <a:t>提供基底屬性字和生肖喜忌字資料</a:t>
-            </a:r>
-            <a:endParaRPr lang="en-US" altLang="zh-TW" sz="2800" b="1" dirty="0">
-              <a:latin typeface="Times New Roman" panose="02020603050405020304" pitchFamily="18" charset="0"/>
-              <a:ea typeface="標楷體" panose="03000509000000000000" pitchFamily="65" charset="-120"/>
-              <a:cs typeface="Times New Roman" panose="02020603050405020304" pitchFamily="18" charset="0"/>
-            </a:endParaRPr>
-          </a:p>
-          <a:p>
-            <a:pPr marL="457200" indent="-457200">
-              <a:buFont typeface="Arial" panose="020B0604020202020204" pitchFamily="34" charset="0"/>
-              <a:buChar char="•"/>
-            </a:pPr>
-            <a:r>
-              <a:rPr lang="en-US" altLang="zh-TW" sz="2800" dirty="0">
-                <a:latin typeface="Times New Roman" panose="02020603050405020304" pitchFamily="18" charset="0"/>
-                <a:ea typeface="標楷體" panose="03000509000000000000" pitchFamily="65" charset="-120"/>
-                <a:cs typeface="Times New Roman" panose="02020603050405020304" pitchFamily="18" charset="0"/>
-                <a:hlinkClick r:id="rId2"/>
-              </a:rPr>
-              <a:t>https://blog.johnwu.cc/article/%E6%96%B0%E7%94%9F%E5%85%92%E5%8F%96%E5%90%8D.html</a:t>
-            </a:r>
-            <a:endParaRPr lang="en-US" altLang="zh-TW" sz="2800" dirty="0">
-              <a:latin typeface="Times New Roman" panose="02020603050405020304" pitchFamily="18" charset="0"/>
-              <a:ea typeface="標楷體" panose="03000509000000000000" pitchFamily="65" charset="-120"/>
-              <a:cs typeface="Times New Roman" panose="02020603050405020304" pitchFamily="18" charset="0"/>
-            </a:endParaRPr>
-          </a:p>
-          <a:p>
-            <a:r>
-              <a:rPr lang="zh-TW" altLang="en-US" sz="2800" b="1" dirty="0">
-                <a:latin typeface="標楷體" panose="03000509000000000000" pitchFamily="65" charset="-120"/>
-                <a:ea typeface="標楷體" panose="03000509000000000000" pitchFamily="65" charset="-120"/>
-                <a:cs typeface="Times New Roman" panose="02020603050405020304" pitchFamily="18" charset="0"/>
-              </a:rPr>
-              <a:t>山水畫生成器</a:t>
-            </a:r>
-            <a:r>
-              <a:rPr lang="en-US" altLang="zh-TW" sz="2800" b="1" dirty="0">
-                <a:latin typeface="標楷體" panose="03000509000000000000" pitchFamily="65" charset="-120"/>
-                <a:ea typeface="標楷體" panose="03000509000000000000" pitchFamily="65" charset="-120"/>
-                <a:cs typeface="Times New Roman" panose="02020603050405020304" pitchFamily="18" charset="0"/>
-              </a:rPr>
-              <a:t>-</a:t>
-            </a:r>
-            <a:r>
-              <a:rPr lang="zh-TW" altLang="en-US" sz="2800" b="1" dirty="0">
-                <a:latin typeface="標楷體" panose="03000509000000000000" pitchFamily="65" charset="-120"/>
-                <a:ea typeface="標楷體" panose="03000509000000000000" pitchFamily="65" charset="-120"/>
-                <a:cs typeface="Times New Roman" panose="02020603050405020304" pitchFamily="18" charset="0"/>
-              </a:rPr>
-              <a:t>提供背景圖片</a:t>
-            </a:r>
-            <a:endParaRPr lang="en-US" altLang="zh-TW" sz="2800" b="1" dirty="0">
-              <a:latin typeface="標楷體" panose="03000509000000000000" pitchFamily="65" charset="-120"/>
-              <a:ea typeface="標楷體" panose="03000509000000000000" pitchFamily="65" charset="-120"/>
-              <a:cs typeface="Times New Roman" panose="02020603050405020304" pitchFamily="18" charset="0"/>
-            </a:endParaRPr>
-          </a:p>
-          <a:p>
-            <a:pPr marL="457200" indent="-457200">
-              <a:buFont typeface="Arial" panose="020B0604020202020204" pitchFamily="34" charset="0"/>
-              <a:buChar char="•"/>
-            </a:pPr>
-            <a:r>
-              <a:rPr lang="en-US" altLang="zh-TW" sz="2800" dirty="0">
-                <a:latin typeface="Times New Roman" panose="02020603050405020304" pitchFamily="18" charset="0"/>
-                <a:ea typeface="標楷體" panose="03000509000000000000" pitchFamily="65" charset="-120"/>
-                <a:cs typeface="Times New Roman" panose="02020603050405020304" pitchFamily="18" charset="0"/>
-                <a:hlinkClick r:id="rId3"/>
-              </a:rPr>
-              <a:t>https://shan-shui-inf.lingdong.works/</a:t>
-            </a:r>
-            <a:endParaRPr lang="en-US" altLang="zh-TW" sz="2800" dirty="0">
-              <a:latin typeface="Times New Roman" panose="02020603050405020304" pitchFamily="18" charset="0"/>
-              <a:ea typeface="標楷體" panose="03000509000000000000" pitchFamily="65" charset="-120"/>
-              <a:cs typeface="Times New Roman" panose="02020603050405020304" pitchFamily="18" charset="0"/>
-            </a:endParaRPr>
-          </a:p>
-          <a:p>
-            <a:r>
-              <a:rPr lang="zh-TW" altLang="en-US" sz="2800" b="1" dirty="0">
-                <a:latin typeface="Times New Roman" panose="02020603050405020304" pitchFamily="18" charset="0"/>
-                <a:ea typeface="標楷體" panose="03000509000000000000" pitchFamily="65" charset="-120"/>
-                <a:cs typeface="Times New Roman" panose="02020603050405020304" pitchFamily="18" charset="0"/>
-              </a:rPr>
-              <a:t>英漢辭典</a:t>
-            </a:r>
-            <a:r>
-              <a:rPr lang="en-US" altLang="zh-TW" sz="2800" b="1" dirty="0">
-                <a:latin typeface="Times New Roman" panose="02020603050405020304" pitchFamily="18" charset="0"/>
-                <a:ea typeface="標楷體" panose="03000509000000000000" pitchFamily="65" charset="-120"/>
-                <a:cs typeface="Times New Roman" panose="02020603050405020304" pitchFamily="18" charset="0"/>
-              </a:rPr>
-              <a:t>-</a:t>
-            </a:r>
-            <a:r>
-              <a:rPr lang="zh-TW" altLang="en-US" sz="2800" b="1" dirty="0">
-                <a:latin typeface="Times New Roman" panose="02020603050405020304" pitchFamily="18" charset="0"/>
-                <a:ea typeface="標楷體" panose="03000509000000000000" pitchFamily="65" charset="-120"/>
-                <a:cs typeface="Times New Roman" panose="02020603050405020304" pitchFamily="18" charset="0"/>
-              </a:rPr>
-              <a:t>修正基底資料的問題</a:t>
-            </a:r>
-            <a:endParaRPr lang="en-US" altLang="zh-TW" sz="2800" b="1" dirty="0">
-              <a:latin typeface="Times New Roman" panose="02020603050405020304" pitchFamily="18" charset="0"/>
-              <a:ea typeface="標楷體" panose="03000509000000000000" pitchFamily="65" charset="-120"/>
-              <a:cs typeface="Times New Roman" panose="02020603050405020304" pitchFamily="18" charset="0"/>
-            </a:endParaRPr>
-          </a:p>
-          <a:p>
-            <a:pPr marL="457200" indent="-457200">
-              <a:buFont typeface="Arial" panose="020B0604020202020204" pitchFamily="34" charset="0"/>
-              <a:buChar char="•"/>
-            </a:pPr>
-            <a:r>
-              <a:rPr lang="en-US" altLang="zh-TW" sz="2800" dirty="0">
-                <a:latin typeface="Times New Roman" panose="02020603050405020304" pitchFamily="18" charset="0"/>
-                <a:ea typeface="標楷體" panose="03000509000000000000" pitchFamily="65" charset="-120"/>
-                <a:cs typeface="Times New Roman" panose="02020603050405020304" pitchFamily="18" charset="0"/>
-                <a:hlinkClick r:id="rId4"/>
-              </a:rPr>
-              <a:t>https://www.chinesewords.org/en/</a:t>
-            </a:r>
-            <a:endParaRPr lang="en-US" altLang="zh-TW" sz="2800" dirty="0">
-              <a:latin typeface="Times New Roman" panose="02020603050405020304" pitchFamily="18" charset="0"/>
-              <a:ea typeface="標楷體" panose="03000509000000000000" pitchFamily="65" charset="-120"/>
-              <a:cs typeface="Times New Roman" panose="02020603050405020304" pitchFamily="18" charset="0"/>
-            </a:endParaRPr>
-          </a:p>
-          <a:p>
-            <a:endParaRPr lang="zh-TW" altLang="en-US" sz="2800" dirty="0">
-              <a:latin typeface="Times New Roman" panose="02020603050405020304" pitchFamily="18" charset="0"/>
-              <a:ea typeface="標楷體" panose="03000509000000000000" pitchFamily="65" charset="-120"/>
-              <a:cs typeface="Times New Roman" panose="02020603050405020304" pitchFamily="18" charset="0"/>
-            </a:endParaRPr>
-          </a:p>
-        </p:txBody>
-      </p:sp>
+      </p:pic>
     </p:spTree>
     <p:extLst>
       <p:ext uri="{BB962C8B-B14F-4D97-AF65-F5344CB8AC3E}">
@@ -9686,10 +9427,10 @@
       </p:grpSpPr>
       <p:sp>
         <p:nvSpPr>
-          <p:cNvPr id="2" name="文字方塊 1">
+          <p:cNvPr id="23" name="文字方塊 22">
             <a:extLst>
               <a:ext uri="{FF2B5EF4-FFF2-40B4-BE49-F238E27FC236}">
-                <a16:creationId xmlns:a16="http://schemas.microsoft.com/office/drawing/2014/main" id="{A5E24B5C-A8E3-3B87-50D7-E6B8CA499D96}"/>
+                <a16:creationId xmlns:a16="http://schemas.microsoft.com/office/drawing/2014/main" id="{5BB1164E-9A2C-E291-956F-CB0E5B4F6529}"/>
               </a:ext>
             </a:extLst>
           </p:cNvPr>
@@ -9698,8 +9439,8 @@
         </p:nvSpPr>
         <p:spPr>
           <a:xfrm>
-            <a:off x="4981575" y="2667000"/>
-            <a:ext cx="6838950" cy="1015663"/>
+            <a:off x="506376" y="191608"/>
+            <a:ext cx="5530924" cy="584775"/>
           </a:xfrm>
           <a:prstGeom prst="rect">
             <a:avLst/>
@@ -9713,17 +9454,414 @@
           <a:lstStyle/>
           <a:p>
             <a:r>
-              <a:rPr lang="en-US" altLang="zh-TW" sz="6000" b="1" dirty="0"/>
-              <a:t>End</a:t>
-            </a:r>
-            <a:endParaRPr lang="zh-TW" altLang="en-US" sz="6000" b="1" dirty="0"/>
+              <a:rPr lang="zh-TW" altLang="en-US" sz="3200" dirty="0">
+                <a:latin typeface="標楷體" panose="03000509000000000000" pitchFamily="65" charset="-120"/>
+                <a:ea typeface="標楷體" panose="03000509000000000000" pitchFamily="65" charset="-120"/>
+              </a:rPr>
+              <a:t>使用工具及參考資料</a:t>
+            </a:r>
+            <a:endParaRPr lang="en-US" altLang="zh-TW" sz="3200" dirty="0">
+              <a:latin typeface="標楷體" panose="03000509000000000000" pitchFamily="65" charset="-120"/>
+              <a:ea typeface="標楷體" panose="03000509000000000000" pitchFamily="65" charset="-120"/>
+            </a:endParaRPr>
+          </a:p>
+        </p:txBody>
+      </p:sp>
+      <p:sp>
+        <p:nvSpPr>
+          <p:cNvPr id="5" name="文字方塊 4">
+            <a:extLst>
+              <a:ext uri="{FF2B5EF4-FFF2-40B4-BE49-F238E27FC236}">
+                <a16:creationId xmlns:a16="http://schemas.microsoft.com/office/drawing/2014/main" id="{0272076D-5EC8-EC40-5E82-A042B288E3DC}"/>
+              </a:ext>
+            </a:extLst>
+          </p:cNvPr>
+          <p:cNvSpPr txBox="1"/>
+          <p:nvPr/>
+        </p:nvSpPr>
+        <p:spPr>
+          <a:xfrm>
+            <a:off x="257176" y="974788"/>
+            <a:ext cx="11934824" cy="5693866"/>
+          </a:xfrm>
+          <a:prstGeom prst="rect">
+            <a:avLst/>
+          </a:prstGeom>
+          <a:noFill/>
+        </p:spPr>
+        <p:txBody>
+          <a:bodyPr wrap="square" rtlCol="0">
+            <a:spAutoFit/>
+          </a:bodyPr>
+          <a:lstStyle/>
+          <a:p>
+            <a:r>
+              <a:rPr lang="en-US" altLang="zh-TW" sz="2800" b="0" i="0" dirty="0">
+                <a:effectLst/>
+                <a:latin typeface="Times New Roman" panose="02020603050405020304" pitchFamily="18" charset="0"/>
+                <a:ea typeface="標楷體" panose="03000509000000000000" pitchFamily="65" charset="-120"/>
+                <a:cs typeface="Times New Roman" panose="02020603050405020304" pitchFamily="18" charset="0"/>
+              </a:rPr>
+              <a:t>HTML, CSS, Bootstrap, </a:t>
+            </a:r>
+            <a:r>
+              <a:rPr lang="en-US" altLang="zh-TW" sz="2800" b="0" i="0" dirty="0" err="1">
+                <a:effectLst/>
+                <a:latin typeface="Times New Roman" panose="02020603050405020304" pitchFamily="18" charset="0"/>
+                <a:ea typeface="標楷體" panose="03000509000000000000" pitchFamily="65" charset="-120"/>
+                <a:cs typeface="Times New Roman" panose="02020603050405020304" pitchFamily="18" charset="0"/>
+              </a:rPr>
+              <a:t>Jquery</a:t>
+            </a:r>
+            <a:r>
+              <a:rPr lang="en-US" altLang="zh-TW" sz="2800" b="0" i="0" dirty="0">
+                <a:effectLst/>
+                <a:latin typeface="Times New Roman" panose="02020603050405020304" pitchFamily="18" charset="0"/>
+                <a:ea typeface="標楷體" panose="03000509000000000000" pitchFamily="65" charset="-120"/>
+                <a:cs typeface="Times New Roman" panose="02020603050405020304" pitchFamily="18" charset="0"/>
+              </a:rPr>
+              <a:t>, </a:t>
+            </a:r>
+            <a:r>
+              <a:rPr lang="en-US" altLang="zh-TW" sz="2800" dirty="0">
+                <a:latin typeface="Times New Roman" panose="02020603050405020304" pitchFamily="18" charset="0"/>
+                <a:ea typeface="標楷體" panose="03000509000000000000" pitchFamily="65" charset="-120"/>
+                <a:cs typeface="Times New Roman" panose="02020603050405020304" pitchFamily="18" charset="0"/>
+              </a:rPr>
+              <a:t>MYSQL</a:t>
+            </a:r>
+            <a:endParaRPr lang="en-US" altLang="zh-TW" sz="2800" b="0" i="0" dirty="0">
+              <a:effectLst/>
+              <a:latin typeface="Times New Roman" panose="02020603050405020304" pitchFamily="18" charset="0"/>
+              <a:ea typeface="標楷體" panose="03000509000000000000" pitchFamily="65" charset="-120"/>
+              <a:cs typeface="Times New Roman" panose="02020603050405020304" pitchFamily="18" charset="0"/>
+            </a:endParaRPr>
+          </a:p>
+          <a:p>
+            <a:r>
+              <a:rPr lang="en-US" altLang="zh-TW" sz="2800" b="0" i="0" dirty="0">
+                <a:effectLst/>
+                <a:latin typeface="Times New Roman" panose="02020603050405020304" pitchFamily="18" charset="0"/>
+                <a:ea typeface="標楷體" panose="03000509000000000000" pitchFamily="65" charset="-120"/>
+                <a:cs typeface="Times New Roman" panose="02020603050405020304" pitchFamily="18" charset="0"/>
+              </a:rPr>
+              <a:t>Node.js- express, </a:t>
+            </a:r>
+            <a:r>
+              <a:rPr lang="en-US" altLang="zh-TW" sz="2800" b="0" i="0" dirty="0" err="1">
+                <a:effectLst/>
+                <a:latin typeface="Times New Roman" panose="02020603050405020304" pitchFamily="18" charset="0"/>
+                <a:ea typeface="標楷體" panose="03000509000000000000" pitchFamily="65" charset="-120"/>
+                <a:cs typeface="Times New Roman" panose="02020603050405020304" pitchFamily="18" charset="0"/>
+              </a:rPr>
+              <a:t>mysql</a:t>
+            </a:r>
+            <a:r>
+              <a:rPr lang="en-US" altLang="zh-TW" sz="2800" b="0" i="0" dirty="0">
+                <a:effectLst/>
+                <a:latin typeface="Times New Roman" panose="02020603050405020304" pitchFamily="18" charset="0"/>
+                <a:ea typeface="標楷體" panose="03000509000000000000" pitchFamily="65" charset="-120"/>
+                <a:cs typeface="Times New Roman" panose="02020603050405020304" pitchFamily="18" charset="0"/>
+              </a:rPr>
+              <a:t>, puppeteer, toast</a:t>
+            </a:r>
+            <a:r>
+              <a:rPr lang="zh-TW" altLang="en-US" sz="2800" b="0" i="0" dirty="0">
+                <a:effectLst/>
+                <a:latin typeface="Times New Roman" panose="02020603050405020304" pitchFamily="18" charset="0"/>
+                <a:ea typeface="標楷體" panose="03000509000000000000" pitchFamily="65" charset="-120"/>
+                <a:cs typeface="Times New Roman" panose="02020603050405020304" pitchFamily="18" charset="0"/>
+              </a:rPr>
+              <a:t> </a:t>
+            </a:r>
+            <a:r>
+              <a:rPr lang="en-US" altLang="zh-TW" sz="2800" b="0" i="0" dirty="0">
+                <a:effectLst/>
+                <a:latin typeface="Times New Roman" panose="02020603050405020304" pitchFamily="18" charset="0"/>
+                <a:ea typeface="標楷體" panose="03000509000000000000" pitchFamily="65" charset="-120"/>
+                <a:cs typeface="Times New Roman" panose="02020603050405020304" pitchFamily="18" charset="0"/>
+              </a:rPr>
+              <a:t>(</a:t>
+            </a:r>
+            <a:r>
+              <a:rPr lang="zh-TW" altLang="en-US" sz="2800" b="0" i="0" dirty="0">
+                <a:effectLst/>
+                <a:latin typeface="Times New Roman" panose="02020603050405020304" pitchFamily="18" charset="0"/>
+                <a:ea typeface="標楷體" panose="03000509000000000000" pitchFamily="65" charset="-120"/>
+                <a:cs typeface="Times New Roman" panose="02020603050405020304" pitchFamily="18" charset="0"/>
+              </a:rPr>
+              <a:t>錢老師上課資料為基底修改</a:t>
+            </a:r>
+            <a:r>
+              <a:rPr lang="en-US" altLang="zh-TW" sz="2800" b="0" i="0" dirty="0">
+                <a:effectLst/>
+                <a:latin typeface="Times New Roman" panose="02020603050405020304" pitchFamily="18" charset="0"/>
+                <a:ea typeface="標楷體" panose="03000509000000000000" pitchFamily="65" charset="-120"/>
+                <a:cs typeface="Times New Roman" panose="02020603050405020304" pitchFamily="18" charset="0"/>
+              </a:rPr>
+              <a:t>)</a:t>
+            </a:r>
+          </a:p>
+          <a:p>
+            <a:r>
+              <a:rPr lang="en-US" altLang="zh-TW" sz="2800" b="0" i="0" dirty="0">
+                <a:solidFill>
+                  <a:srgbClr val="7030A0"/>
+                </a:solidFill>
+                <a:effectLst/>
+                <a:latin typeface="Times New Roman" panose="02020603050405020304" pitchFamily="18" charset="0"/>
+                <a:ea typeface="標楷體" panose="03000509000000000000" pitchFamily="65" charset="-120"/>
+                <a:cs typeface="Times New Roman" panose="02020603050405020304" pitchFamily="18" charset="0"/>
+              </a:rPr>
+              <a:t>-----------</a:t>
+            </a:r>
+            <a:r>
+              <a:rPr lang="zh-TW" altLang="en-US" sz="2800" b="0" i="0" dirty="0">
+                <a:solidFill>
+                  <a:srgbClr val="7030A0"/>
+                </a:solidFill>
+                <a:effectLst/>
+                <a:latin typeface="Times New Roman" panose="02020603050405020304" pitchFamily="18" charset="0"/>
+                <a:ea typeface="標楷體" panose="03000509000000000000" pitchFamily="65" charset="-120"/>
+                <a:cs typeface="Times New Roman" panose="02020603050405020304" pitchFamily="18" charset="0"/>
+              </a:rPr>
+              <a:t>自製工具</a:t>
+            </a:r>
+            <a:r>
+              <a:rPr lang="en-US" altLang="zh-TW" sz="2800" b="0" i="0" dirty="0">
+                <a:solidFill>
+                  <a:srgbClr val="7030A0"/>
+                </a:solidFill>
+                <a:effectLst/>
+                <a:latin typeface="Times New Roman" panose="02020603050405020304" pitchFamily="18" charset="0"/>
+                <a:ea typeface="標楷體" panose="03000509000000000000" pitchFamily="65" charset="-120"/>
+                <a:cs typeface="Times New Roman" panose="02020603050405020304" pitchFamily="18" charset="0"/>
+              </a:rPr>
+              <a:t>--------------------</a:t>
+            </a:r>
+          </a:p>
+          <a:p>
+            <a:r>
+              <a:rPr lang="en-US" altLang="zh-TW" sz="2800" b="1" dirty="0">
+                <a:latin typeface="Times New Roman" panose="02020603050405020304" pitchFamily="18" charset="0"/>
+                <a:ea typeface="標楷體" panose="03000509000000000000" pitchFamily="65" charset="-120"/>
+                <a:cs typeface="Times New Roman" panose="02020603050405020304" pitchFamily="18" charset="0"/>
+              </a:rPr>
+              <a:t>Json</a:t>
+            </a:r>
+            <a:r>
+              <a:rPr lang="zh-TW" altLang="en-US" sz="2800" b="1" dirty="0">
+                <a:latin typeface="Times New Roman" panose="02020603050405020304" pitchFamily="18" charset="0"/>
+                <a:ea typeface="標楷體" panose="03000509000000000000" pitchFamily="65" charset="-120"/>
+                <a:cs typeface="Times New Roman" panose="02020603050405020304" pitchFamily="18" charset="0"/>
+              </a:rPr>
+              <a:t>檔案自動寫入資料庫、資料庫資料檢查、比對網路資料自動修正資料庫</a:t>
+            </a:r>
+            <a:endParaRPr lang="en-US" altLang="zh-TW" sz="2800" b="1" i="0" dirty="0">
+              <a:effectLst/>
+              <a:latin typeface="Times New Roman" panose="02020603050405020304" pitchFamily="18" charset="0"/>
+              <a:ea typeface="標楷體" panose="03000509000000000000" pitchFamily="65" charset="-120"/>
+              <a:cs typeface="Times New Roman" panose="02020603050405020304" pitchFamily="18" charset="0"/>
+            </a:endParaRPr>
+          </a:p>
+          <a:p>
+            <a:r>
+              <a:rPr lang="en-US" altLang="zh-TW" sz="2800" b="0" i="0" dirty="0">
+                <a:solidFill>
+                  <a:srgbClr val="7030A0"/>
+                </a:solidFill>
+                <a:effectLst/>
+                <a:latin typeface="Times New Roman" panose="02020603050405020304" pitchFamily="18" charset="0"/>
+                <a:ea typeface="標楷體" panose="03000509000000000000" pitchFamily="65" charset="-120"/>
+                <a:cs typeface="Times New Roman" panose="02020603050405020304" pitchFamily="18" charset="0"/>
+              </a:rPr>
+              <a:t>-----------</a:t>
+            </a:r>
+            <a:r>
+              <a:rPr lang="zh-TW" altLang="en-US" sz="2800" b="0" i="0" dirty="0">
+                <a:solidFill>
+                  <a:srgbClr val="7030A0"/>
+                </a:solidFill>
+                <a:effectLst/>
+                <a:latin typeface="Times New Roman" panose="02020603050405020304" pitchFamily="18" charset="0"/>
+                <a:ea typeface="標楷體" panose="03000509000000000000" pitchFamily="65" charset="-120"/>
+                <a:cs typeface="Times New Roman" panose="02020603050405020304" pitchFamily="18" charset="0"/>
+              </a:rPr>
+              <a:t>參考資料</a:t>
+            </a:r>
+            <a:r>
+              <a:rPr lang="en-US" altLang="zh-TW" sz="2800" b="0" i="0" dirty="0">
+                <a:solidFill>
+                  <a:srgbClr val="7030A0"/>
+                </a:solidFill>
+                <a:effectLst/>
+                <a:latin typeface="Times New Roman" panose="02020603050405020304" pitchFamily="18" charset="0"/>
+                <a:ea typeface="標楷體" panose="03000509000000000000" pitchFamily="65" charset="-120"/>
+                <a:cs typeface="Times New Roman" panose="02020603050405020304" pitchFamily="18" charset="0"/>
+              </a:rPr>
+              <a:t>--------------------</a:t>
+            </a:r>
+          </a:p>
+          <a:p>
+            <a:r>
+              <a:rPr lang="en-US" altLang="zh-TW" sz="2800" b="1" i="0" dirty="0">
+                <a:effectLst/>
+                <a:latin typeface="Times New Roman" panose="02020603050405020304" pitchFamily="18" charset="0"/>
+                <a:ea typeface="標楷體" panose="03000509000000000000" pitchFamily="65" charset="-120"/>
+                <a:cs typeface="Times New Roman" panose="02020603050405020304" pitchFamily="18" charset="0"/>
+              </a:rPr>
+              <a:t>John Wu’s Blog-</a:t>
+            </a:r>
+            <a:r>
+              <a:rPr lang="zh-TW" altLang="en-US" sz="2800" b="1" i="0" dirty="0">
+                <a:effectLst/>
+                <a:latin typeface="Times New Roman" panose="02020603050405020304" pitchFamily="18" charset="0"/>
+                <a:ea typeface="標楷體" panose="03000509000000000000" pitchFamily="65" charset="-120"/>
+                <a:cs typeface="Times New Roman" panose="02020603050405020304" pitchFamily="18" charset="0"/>
+              </a:rPr>
+              <a:t>提供基底屬性字和生肖喜忌字資料</a:t>
+            </a:r>
+            <a:endParaRPr lang="en-US" altLang="zh-TW" sz="2800" b="1" dirty="0">
+              <a:latin typeface="Times New Roman" panose="02020603050405020304" pitchFamily="18" charset="0"/>
+              <a:ea typeface="標楷體" panose="03000509000000000000" pitchFamily="65" charset="-120"/>
+              <a:cs typeface="Times New Roman" panose="02020603050405020304" pitchFamily="18" charset="0"/>
+            </a:endParaRPr>
+          </a:p>
+          <a:p>
+            <a:pPr marL="457200" indent="-457200">
+              <a:buFont typeface="Arial" panose="020B0604020202020204" pitchFamily="34" charset="0"/>
+              <a:buChar char="•"/>
+            </a:pPr>
+            <a:r>
+              <a:rPr lang="en-US" altLang="zh-TW" sz="2800" dirty="0">
+                <a:latin typeface="Times New Roman" panose="02020603050405020304" pitchFamily="18" charset="0"/>
+                <a:ea typeface="標楷體" panose="03000509000000000000" pitchFamily="65" charset="-120"/>
+                <a:cs typeface="Times New Roman" panose="02020603050405020304" pitchFamily="18" charset="0"/>
+                <a:hlinkClick r:id="rId2"/>
+              </a:rPr>
+              <a:t>https://blog.johnwu.cc/article/%E6%96%B0%E7%94%9F%E5%85%92%E5%8F%96%E5%90%8D.html</a:t>
+            </a:r>
+            <a:endParaRPr lang="en-US" altLang="zh-TW" sz="2800" dirty="0">
+              <a:latin typeface="Times New Roman" panose="02020603050405020304" pitchFamily="18" charset="0"/>
+              <a:ea typeface="標楷體" panose="03000509000000000000" pitchFamily="65" charset="-120"/>
+              <a:cs typeface="Times New Roman" panose="02020603050405020304" pitchFamily="18" charset="0"/>
+            </a:endParaRPr>
+          </a:p>
+          <a:p>
+            <a:r>
+              <a:rPr lang="zh-TW" altLang="en-US" sz="2800" b="1" dirty="0">
+                <a:latin typeface="標楷體" panose="03000509000000000000" pitchFamily="65" charset="-120"/>
+                <a:ea typeface="標楷體" panose="03000509000000000000" pitchFamily="65" charset="-120"/>
+                <a:cs typeface="Times New Roman" panose="02020603050405020304" pitchFamily="18" charset="0"/>
+              </a:rPr>
+              <a:t>山水畫生成器</a:t>
+            </a:r>
+            <a:r>
+              <a:rPr lang="en-US" altLang="zh-TW" sz="2800" b="1" dirty="0">
+                <a:latin typeface="標楷體" panose="03000509000000000000" pitchFamily="65" charset="-120"/>
+                <a:ea typeface="標楷體" panose="03000509000000000000" pitchFamily="65" charset="-120"/>
+                <a:cs typeface="Times New Roman" panose="02020603050405020304" pitchFamily="18" charset="0"/>
+              </a:rPr>
+              <a:t>-</a:t>
+            </a:r>
+            <a:r>
+              <a:rPr lang="zh-TW" altLang="en-US" sz="2800" b="1" dirty="0">
+                <a:latin typeface="標楷體" panose="03000509000000000000" pitchFamily="65" charset="-120"/>
+                <a:ea typeface="標楷體" panose="03000509000000000000" pitchFamily="65" charset="-120"/>
+                <a:cs typeface="Times New Roman" panose="02020603050405020304" pitchFamily="18" charset="0"/>
+              </a:rPr>
+              <a:t>提供背景圖片</a:t>
+            </a:r>
+            <a:endParaRPr lang="en-US" altLang="zh-TW" sz="2800" b="1" dirty="0">
+              <a:latin typeface="標楷體" panose="03000509000000000000" pitchFamily="65" charset="-120"/>
+              <a:ea typeface="標楷體" panose="03000509000000000000" pitchFamily="65" charset="-120"/>
+              <a:cs typeface="Times New Roman" panose="02020603050405020304" pitchFamily="18" charset="0"/>
+            </a:endParaRPr>
+          </a:p>
+          <a:p>
+            <a:pPr marL="457200" indent="-457200">
+              <a:buFont typeface="Arial" panose="020B0604020202020204" pitchFamily="34" charset="0"/>
+              <a:buChar char="•"/>
+            </a:pPr>
+            <a:r>
+              <a:rPr lang="en-US" altLang="zh-TW" sz="2800" dirty="0">
+                <a:latin typeface="Times New Roman" panose="02020603050405020304" pitchFamily="18" charset="0"/>
+                <a:ea typeface="標楷體" panose="03000509000000000000" pitchFamily="65" charset="-120"/>
+                <a:cs typeface="Times New Roman" panose="02020603050405020304" pitchFamily="18" charset="0"/>
+                <a:hlinkClick r:id="rId3"/>
+              </a:rPr>
+              <a:t>https://shan-shui-inf.lingdong.works/</a:t>
+            </a:r>
+            <a:endParaRPr lang="en-US" altLang="zh-TW" sz="2800" dirty="0">
+              <a:latin typeface="Times New Roman" panose="02020603050405020304" pitchFamily="18" charset="0"/>
+              <a:ea typeface="標楷體" panose="03000509000000000000" pitchFamily="65" charset="-120"/>
+              <a:cs typeface="Times New Roman" panose="02020603050405020304" pitchFamily="18" charset="0"/>
+            </a:endParaRPr>
+          </a:p>
+          <a:p>
+            <a:r>
+              <a:rPr lang="zh-TW" altLang="en-US" sz="2800" b="1" dirty="0">
+                <a:latin typeface="Times New Roman" panose="02020603050405020304" pitchFamily="18" charset="0"/>
+                <a:ea typeface="標楷體" panose="03000509000000000000" pitchFamily="65" charset="-120"/>
+                <a:cs typeface="Times New Roman" panose="02020603050405020304" pitchFamily="18" charset="0"/>
+              </a:rPr>
+              <a:t>英漢辭典</a:t>
+            </a:r>
+            <a:r>
+              <a:rPr lang="en-US" altLang="zh-TW" sz="2800" b="1" dirty="0">
+                <a:latin typeface="Times New Roman" panose="02020603050405020304" pitchFamily="18" charset="0"/>
+                <a:ea typeface="標楷體" panose="03000509000000000000" pitchFamily="65" charset="-120"/>
+                <a:cs typeface="Times New Roman" panose="02020603050405020304" pitchFamily="18" charset="0"/>
+              </a:rPr>
+              <a:t>-</a:t>
+            </a:r>
+            <a:r>
+              <a:rPr lang="zh-TW" altLang="en-US" sz="2800" b="1" dirty="0">
+                <a:latin typeface="Times New Roman" panose="02020603050405020304" pitchFamily="18" charset="0"/>
+                <a:ea typeface="標楷體" panose="03000509000000000000" pitchFamily="65" charset="-120"/>
+                <a:cs typeface="Times New Roman" panose="02020603050405020304" pitchFamily="18" charset="0"/>
+              </a:rPr>
+              <a:t>修正基底資料的問題</a:t>
+            </a:r>
+            <a:endParaRPr lang="en-US" altLang="zh-TW" sz="2800" b="1" dirty="0">
+              <a:latin typeface="Times New Roman" panose="02020603050405020304" pitchFamily="18" charset="0"/>
+              <a:ea typeface="標楷體" panose="03000509000000000000" pitchFamily="65" charset="-120"/>
+              <a:cs typeface="Times New Roman" panose="02020603050405020304" pitchFamily="18" charset="0"/>
+            </a:endParaRPr>
+          </a:p>
+          <a:p>
+            <a:pPr marL="457200" indent="-457200">
+              <a:buFont typeface="Arial" panose="020B0604020202020204" pitchFamily="34" charset="0"/>
+              <a:buChar char="•"/>
+            </a:pPr>
+            <a:r>
+              <a:rPr lang="en-US" altLang="zh-TW" sz="2800" dirty="0">
+                <a:latin typeface="Times New Roman" panose="02020603050405020304" pitchFamily="18" charset="0"/>
+                <a:ea typeface="標楷體" panose="03000509000000000000" pitchFamily="65" charset="-120"/>
+                <a:cs typeface="Times New Roman" panose="02020603050405020304" pitchFamily="18" charset="0"/>
+                <a:hlinkClick r:id="rId4"/>
+              </a:rPr>
+              <a:t>https://www.chinesewords.org/en/</a:t>
+            </a:r>
+            <a:endParaRPr lang="en-US" altLang="zh-TW" sz="2800" dirty="0">
+              <a:latin typeface="Times New Roman" panose="02020603050405020304" pitchFamily="18" charset="0"/>
+              <a:ea typeface="標楷體" panose="03000509000000000000" pitchFamily="65" charset="-120"/>
+              <a:cs typeface="Times New Roman" panose="02020603050405020304" pitchFamily="18" charset="0"/>
+            </a:endParaRPr>
+          </a:p>
+          <a:p>
+            <a:endParaRPr lang="zh-TW" altLang="en-US" sz="2800" dirty="0">
+              <a:latin typeface="Times New Roman" panose="02020603050405020304" pitchFamily="18" charset="0"/>
+              <a:ea typeface="標楷體" panose="03000509000000000000" pitchFamily="65" charset="-120"/>
+              <a:cs typeface="Times New Roman" panose="02020603050405020304" pitchFamily="18" charset="0"/>
+            </a:endParaRPr>
           </a:p>
         </p:txBody>
       </p:sp>
     </p:spTree>
     <p:extLst>
       <p:ext uri="{BB962C8B-B14F-4D97-AF65-F5344CB8AC3E}">
-        <p14:creationId xmlns:p14="http://schemas.microsoft.com/office/powerpoint/2010/main" val="1384770515"/>
+        <p14:creationId xmlns:p14="http://schemas.microsoft.com/office/powerpoint/2010/main" val="3405695793"/>
       </p:ext>
     </p:extLst>
   </p:cSld>

</xml_diff>